<commit_message>
Enhance presentation with detailed RAG query examples and complete answers
Added comprehensive Q&A examples showing:
- Instrumentation-only queries with full answers (order execution, book state, function traces)
- Code-only queries with full answers (algorithms, data structures, annotations)
- Combined queries with full answers (order processing, market order behavior, price improvement)

New content:
- 9 detailed Q&A slides with real examples from instrumentation.log
- Complete answers showing what the RAG pipeline would return
- Query categorization (debugging, architecture, performance, compliance)
- Enhanced explanations of dual-index power (theory + practice)
- 29 slides total (up from 21)

Co-Authored-By: Claude Opus 4.6 <noreply@anthropic.com>
</commit_message>
<xml_diff>
--- a/MatchingEngine_Presentation.pptx
+++ b/MatchingEngine_Presentation.pptx
@@ -26,6 +26,14 @@
     <p:sldId id="274" r:id="rId25"/>
     <p:sldId id="275" r:id="rId26"/>
     <p:sldId id="276" r:id="rId27"/>
+    <p:sldId id="277" r:id="rId28"/>
+    <p:sldId id="278" r:id="rId29"/>
+    <p:sldId id="279" r:id="rId30"/>
+    <p:sldId id="280" r:id="rId31"/>
+    <p:sldId id="281" r:id="rId32"/>
+    <p:sldId id="282" r:id="rId33"/>
+    <p:sldId id="283" r:id="rId34"/>
+    <p:sldId id="284" r:id="rId35"/>
   </p:sldIdLst>
   <p:sldSz cx="9144000" cy="6858000" type="screen4x3"/>
   <p:notesSz cx="6858000" cy="9144000"/>
@@ -3184,7 +3192,7 @@
           <a:lstStyle/>
           <a:p>
             <a:r>
-              <a:t>RAG Examples: Instrumentation Queries</a:t>
+              <a:t>RAG Query Categories</a:t>
             </a:r>
           </a:p>
         </p:txBody>
@@ -3209,81 +3217,105 @@
               <a:defRPr sz="1800"/>
             </a:pPr>
             <a:r>
-              <a:t>Query: 'What orders were executed and at what prices?'</a:t>
-            </a:r>
-          </a:p>
-          <a:p>
-            <a:pPr>
-              <a:defRPr sz="1800"/>
-            </a:pPr>
-            <a:r>
-              <a:t>  → Analyzes EXEC_REPORT events from instrumentation.log</a:t>
-            </a:r>
-          </a:p>
-          <a:p>
-            <a:pPr>
-              <a:defRPr sz="1800"/>
-            </a:pPr>
-            <a:r>
-              <a:t>  → Returns order IDs, execution types, quantities, and prices</a:t>
-            </a:r>
-          </a:p>
-          <a:p>
-            <a:pPr>
-              <a:defRPr sz="1800"/>
-            </a:pPr>
-          </a:p>
-          <a:p>
-            <a:pPr>
-              <a:defRPr sz="1800"/>
-            </a:pPr>
-            <a:r>
-              <a:t>Query: 'Show me the order book state after order VQ6EAOKbQdSnFkRmVUQAAA'</a:t>
-            </a:r>
-          </a:p>
-          <a:p>
-            <a:pPr>
-              <a:defRPr sz="1800"/>
-            </a:pPr>
-            <a:r>
-              <a:t>  → Finds SNAPSHOT event for that order ID</a:t>
-            </a:r>
-          </a:p>
-          <a:p>
-            <a:pPr>
-              <a:defRPr sz="1800"/>
-            </a:pPr>
-            <a:r>
-              <a:t>  → Shows buy/sell side price levels with quantities</a:t>
-            </a:r>
-          </a:p>
-          <a:p>
-            <a:pPr>
-              <a:defRPr sz="1800"/>
-            </a:pPr>
-          </a:p>
-          <a:p>
-            <a:pPr>
-              <a:defRPr sz="1800"/>
-            </a:pPr>
-            <a:r>
-              <a:t>Query: 'Which orders had partial fills?'</a:t>
-            </a:r>
-          </a:p>
-          <a:p>
-            <a:pPr>
-              <a:defRPr sz="1800"/>
-            </a:pPr>
-            <a:r>
-              <a:t>  → Filters EXEC_REPORT events with executionType=PARTIAL_FILL</a:t>
-            </a:r>
-          </a:p>
-          <a:p>
-            <a:pPr>
-              <a:defRPr sz="1800"/>
-            </a:pPr>
-            <a:r>
-              <a:t>  → Lists orders with remaining quantities</a:t>
+              <a:t>Instrumentation Queries (/instr):</a:t>
+            </a:r>
+          </a:p>
+          <a:p>
+            <a:pPr>
+              <a:defRPr sz="1800"/>
+            </a:pPr>
+            <a:r>
+              <a:t>  • What happened? Execution traces, order flow, trade history</a:t>
+            </a:r>
+          </a:p>
+          <a:p>
+            <a:pPr>
+              <a:defRPr sz="1800"/>
+            </a:pPr>
+            <a:r>
+              <a:t>  • Debugging: Trace specific orders through the system</a:t>
+            </a:r>
+          </a:p>
+          <a:p>
+            <a:pPr>
+              <a:defRPr sz="1800"/>
+            </a:pPr>
+            <a:r>
+              <a:t>  • Analysis: Market microstructure, order book dynamics</a:t>
+            </a:r>
+          </a:p>
+          <a:p>
+            <a:pPr>
+              <a:defRPr sz="1800"/>
+            </a:pPr>
+          </a:p>
+          <a:p>
+            <a:pPr>
+              <a:defRPr sz="1800"/>
+            </a:pPr>
+            <a:r>
+              <a:t>Code Queries (/code):</a:t>
+            </a:r>
+          </a:p>
+          <a:p>
+            <a:pPr>
+              <a:defRPr sz="1800"/>
+            </a:pPr>
+            <a:r>
+              <a:t>  • How does it work? Algorithm details, data structures</a:t>
+            </a:r>
+          </a:p>
+          <a:p>
+            <a:pPr>
+              <a:defRPr sz="1800"/>
+            </a:pPr>
+            <a:r>
+              <a:t>  • Architecture: Component interactions, design patterns</a:t>
+            </a:r>
+          </a:p>
+          <a:p>
+            <a:pPr>
+              <a:defRPr sz="1800"/>
+            </a:pPr>
+            <a:r>
+              <a:t>  • Learning: Understand matching engine implementation</a:t>
+            </a:r>
+          </a:p>
+          <a:p>
+            <a:pPr>
+              <a:defRPr sz="1800"/>
+            </a:pPr>
+          </a:p>
+          <a:p>
+            <a:pPr>
+              <a:defRPr sz="1800"/>
+            </a:pPr>
+            <a:r>
+              <a:t>Combined Queries (/both):</a:t>
+            </a:r>
+          </a:p>
+          <a:p>
+            <a:pPr>
+              <a:defRPr sz="1800"/>
+            </a:pPr>
+            <a:r>
+              <a:t>  • Why? Connect execution behavior to code logic</a:t>
+            </a:r>
+          </a:p>
+          <a:p>
+            <a:pPr>
+              <a:defRPr sz="1800"/>
+            </a:pPr>
+            <a:r>
+              <a:t>  • Validation: Verify implementation matches behavior</a:t>
+            </a:r>
+          </a:p>
+          <a:p>
+            <a:pPr>
+              <a:defRPr sz="1800"/>
+            </a:pPr>
+            <a:r>
+              <a:t>  • Deep analysis: Theory + practice together</a:t>
             </a:r>
           </a:p>
         </p:txBody>
@@ -3320,108 +3352,136 @@
         <p:txBody>
           <a:bodyPr/>
           <a:lstStyle/>
-          <a:p>
-            <a:r>
-              <a:t>RAG Examples: Code Queries</a:t>
-            </a:r>
-          </a:p>
-        </p:txBody>
-      </p:sp>
-      <p:sp>
-        <p:nvSpPr>
-          <p:cNvPr id="3" name="Content Placeholder 2"/>
-          <p:cNvSpPr>
-            <a:spLocks noGrp="1"/>
-          </p:cNvSpPr>
-          <p:nvPr>
-            <p:ph idx="1"/>
-          </p:nvPr>
-        </p:nvSpPr>
-        <p:spPr/>
-        <p:txBody>
-          <a:bodyPr/>
-          <a:lstStyle/>
           <a:p/>
-          <a:p>
-            <a:pPr>
-              <a:defRPr sz="1800"/>
-            </a:pPr>
-            <a:r>
-              <a:t>Query: 'How does the matching algorithm work?'</a:t>
-            </a:r>
-          </a:p>
-          <a:p>
-            <a:pPr>
-              <a:defRPr sz="1800"/>
-            </a:pPr>
-            <a:r>
-              <a:t>  → Retrieves MatchingEngine.java implementation</a:t>
-            </a:r>
-          </a:p>
-          <a:p>
-            <a:pPr>
-              <a:defRPr sz="1800"/>
-            </a:pPr>
-            <a:r>
-              <a:t>  → Explains executeMatch() logic and price-time priority</a:t>
-            </a:r>
-          </a:p>
-          <a:p>
-            <a:pPr>
-              <a:defRPr sz="1800"/>
-            </a:pPr>
-          </a:p>
-          <a:p>
-            <a:pPr>
-              <a:defRPr sz="1800"/>
-            </a:pPr>
-            <a:r>
-              <a:t>Query: 'What is the order book data structure?'</a:t>
-            </a:r>
-          </a:p>
-          <a:p>
-            <a:pPr>
-              <a:defRPr sz="1800"/>
-            </a:pPr>
-            <a:r>
-              <a:t>  → Analyzes OrderBook.java</a:t>
-            </a:r>
-          </a:p>
-          <a:p>
-            <a:pPr>
-              <a:defRPr sz="1800"/>
-            </a:pPr>
-            <a:r>
-              <a:t>  → Describes TreeMap structure for buy/sell sides</a:t>
-            </a:r>
-          </a:p>
-          <a:p>
-            <a:pPr>
-              <a:defRPr sz="1800"/>
-            </a:pPr>
-          </a:p>
-          <a:p>
-            <a:pPr>
-              <a:defRPr sz="1800"/>
-            </a:pPr>
-            <a:r>
-              <a:t>Query: 'Explain the executeMatch function'</a:t>
-            </a:r>
-          </a:p>
-          <a:p>
-            <a:pPr>
-              <a:defRPr sz="1800"/>
-            </a:pPr>
-            <a:r>
-              <a:t>  → Retrieves method implementation</a:t>
-            </a:r>
-          </a:p>
-          <a:p>
-            <a:pPr>
-              <a:defRPr sz="1800"/>
-            </a:pPr>
-            <a:r>
-              <a:t>  → Explains matching logic, fill calculations, and report generation</a:t>
+        </p:txBody>
+      </p:sp>
+      <p:sp>
+        <p:nvSpPr>
+          <p:cNvPr id="3" name="TextBox 2"/>
+          <p:cNvSpPr txBox="1"/>
+          <p:nvPr/>
+        </p:nvSpPr>
+        <p:spPr>
+          <a:xfrm>
+            <a:off x="457200" y="274320"/>
+            <a:ext cx="8229600" cy="457200"/>
+          </a:xfrm>
+          <a:prstGeom prst="rect">
+            <a:avLst/>
+          </a:prstGeom>
+          <a:noFill/>
+        </p:spPr>
+        <p:txBody>
+          <a:bodyPr wrap="none">
+            <a:spAutoFit/>
+          </a:bodyPr>
+          <a:lstStyle/>
+          <a:p>
+            <a:pPr>
+              <a:defRPr sz="3200" b="1"/>
+            </a:pPr>
+            <a:r>
+              <a:t>Instrumentation Query #1: Order Execution</a:t>
+            </a:r>
+          </a:p>
+        </p:txBody>
+      </p:sp>
+      <p:sp>
+        <p:nvSpPr>
+          <p:cNvPr id="4" name="TextBox 3"/>
+          <p:cNvSpPr txBox="1"/>
+          <p:nvPr/>
+        </p:nvSpPr>
+        <p:spPr>
+          <a:xfrm>
+            <a:off x="457200" y="914400"/>
+            <a:ext cx="8229600" cy="5029200"/>
+          </a:xfrm>
+          <a:prstGeom prst="rect">
+            <a:avLst/>
+          </a:prstGeom>
+          <a:solidFill>
+            <a:srgbClr val="F5F5F5"/>
+          </a:solidFill>
+        </p:spPr>
+        <p:txBody>
+          <a:bodyPr wrap="square">
+            <a:spAutoFit/>
+          </a:bodyPr>
+          <a:lstStyle/>
+          <a:p>
+            <a:pPr>
+              <a:defRPr sz="1100">
+                <a:latin typeface="Courier New"/>
+              </a:defRPr>
+            </a:pPr>
+            <a:r>
+              <a:t>Question: "What orders were executed and at what prices?"</a:t>
+            </a:r>
+            <a:br/>
+            <a:br/>
+            <a:r>
+              <a:t>Answer from RAG Pipeline (/instr):</a:t>
+            </a:r>
+            <a:br/>
+            <a:br/>
+            <a:r>
+              <a:t>Based on the instrumentation log, the following executions occurred:</a:t>
+            </a:r>
+            <a:br/>
+            <a:br/>
+            <a:r>
+              <a:t>1. Order VQ6EAOKbQdSnFkRmVUQAAw (SELL, 8 units)</a:t>
+            </a:r>
+            <a:br/>
+            <a:r>
+              <a:t>   • Execution: FULL_FILL at price 100.60</a:t>
+            </a:r>
+            <a:br/>
+            <a:r>
+              <a:t>   • Matched against order VQ6EAOKbQdSnFkRmVUQAAg (BUY)</a:t>
+            </a:r>
+            <a:br/>
+            <a:r>
+              <a:t>   • Buyer paid 100.60 (seller's limit was 100.55)</a:t>
+            </a:r>
+            <a:br/>
+            <a:br/>
+            <a:r>
+              <a:t>2. Order VQ6EAOKbQdSnFkRmVUQAAg (BUY, 15 units)</a:t>
+            </a:r>
+            <a:br/>
+            <a:r>
+              <a:t>   • Execution: PARTIAL_FILL, 8 units filled at 100.60</a:t>
+            </a:r>
+            <a:br/>
+            <a:r>
+              <a:t>   • Remaining quantity: 7 units (stayed in book at 100.60)</a:t>
+            </a:r>
+            <a:br/>
+            <a:r>
+              <a:t>   • Cumulative filled: 8 units</a:t>
+            </a:r>
+            <a:br/>
+            <a:br/>
+            <a:r>
+              <a:t>3. Order VQ6EAOKbQdSnFkRmVUQABA (BUY MARKET, 12 units)</a:t>
+            </a:r>
+            <a:br/>
+            <a:r>
+              <a:t>   • First fill: PARTIAL_FILL, 5 units at 100.75</a:t>
+            </a:r>
+            <a:br/>
+            <a:r>
+              <a:t>   • Matched against VQ6EAOKbQdSnFkRmVUQAAQ (SELL)</a:t>
+            </a:r>
+            <a:br/>
+            <a:r>
+              <a:t>   • Final: CANCEL with 7 units unfilled (insufficient liquidity)</a:t>
+            </a:r>
+            <a:br/>
+            <a:r>
+              <a:t>   • Total filled: 5 units at 100.75</a:t>
             </a:r>
           </a:p>
         </p:txBody>
@@ -3458,132 +3518,132 @@
         <p:txBody>
           <a:bodyPr/>
           <a:lstStyle/>
-          <a:p>
-            <a:r>
-              <a:t>RAG Examples: Combined Queries</a:t>
-            </a:r>
-          </a:p>
-        </p:txBody>
-      </p:sp>
-      <p:sp>
-        <p:nvSpPr>
-          <p:cNvPr id="3" name="Content Placeholder 2"/>
-          <p:cNvSpPr>
-            <a:spLocks noGrp="1"/>
-          </p:cNvSpPr>
-          <p:nvPr>
-            <p:ph idx="1"/>
-          </p:nvPr>
-        </p:nvSpPr>
-        <p:spPr/>
-        <p:txBody>
-          <a:bodyPr/>
-          <a:lstStyle/>
           <a:p/>
-          <a:p>
-            <a:pPr>
-              <a:defRPr sz="1800"/>
-            </a:pPr>
-            <a:r>
-              <a:t>Query: 'How did the matching engine process market orders?'</a:t>
-            </a:r>
-          </a:p>
-          <a:p>
-            <a:pPr>
-              <a:defRPr sz="1800"/>
-            </a:pPr>
-            <a:r>
-              <a:t>  → Code: Explains market order matching logic</a:t>
-            </a:r>
-          </a:p>
-          <a:p>
-            <a:pPr>
-              <a:defRPr sz="1800"/>
-            </a:pPr>
-            <a:r>
-              <a:t>  → Logs: Shows actual market order executions</a:t>
-            </a:r>
-          </a:p>
-          <a:p>
-            <a:pPr>
-              <a:defRPr sz="1800"/>
-            </a:pPr>
-            <a:r>
-              <a:t>  → Synthesized: Theory + Practice together</a:t>
-            </a:r>
-          </a:p>
-          <a:p>
-            <a:pPr>
-              <a:defRPr sz="1800"/>
-            </a:pPr>
-          </a:p>
-          <a:p>
-            <a:pPr>
-              <a:defRPr sz="1800"/>
-            </a:pPr>
-            <a:r>
-              <a:t>Query: 'Explain what happened when order VQ6EAOKbQdSnFkRmVUQABA was processed'</a:t>
-            </a:r>
-          </a:p>
-          <a:p>
-            <a:pPr>
-              <a:defRPr sz="1800"/>
-            </a:pPr>
-            <a:r>
-              <a:t>  → Logs: Complete execution trace with all events</a:t>
-            </a:r>
-          </a:p>
-          <a:p>
-            <a:pPr>
-              <a:defRPr sz="1800"/>
-            </a:pPr>
-            <a:r>
-              <a:t>  → Code: Function implementations that were called</a:t>
-            </a:r>
-          </a:p>
-          <a:p>
-            <a:pPr>
-              <a:defRPr sz="1800"/>
-            </a:pPr>
-            <a:r>
-              <a:t>  → Synthesized: Step-by-step explanation with code context</a:t>
-            </a:r>
-          </a:p>
-          <a:p>
-            <a:pPr>
-              <a:defRPr sz="1800"/>
-            </a:pPr>
-          </a:p>
-          <a:p>
-            <a:pPr>
-              <a:defRPr sz="1800"/>
-            </a:pPr>
-            <a:r>
-              <a:t>Query: 'What is price-time priority and how is it implemented?'</a:t>
-            </a:r>
-          </a:p>
-          <a:p>
-            <a:pPr>
-              <a:defRPr sz="1800"/>
-            </a:pPr>
-            <a:r>
-              <a:t>  → Code: OrderBook structure and matching algorithm</a:t>
-            </a:r>
-          </a:p>
-          <a:p>
-            <a:pPr>
-              <a:defRPr sz="1800"/>
-            </a:pPr>
-            <a:r>
-              <a:t>  → Logs: Real examples showing FIFO ordering in SNAPSHOT events</a:t>
-            </a:r>
-          </a:p>
-          <a:p>
-            <a:pPr>
-              <a:defRPr sz="1800"/>
-            </a:pPr>
-            <a:r>
-              <a:t>  → Synthesized: Concept + Implementation + Evidence</a:t>
+        </p:txBody>
+      </p:sp>
+      <p:sp>
+        <p:nvSpPr>
+          <p:cNvPr id="3" name="TextBox 2"/>
+          <p:cNvSpPr txBox="1"/>
+          <p:nvPr/>
+        </p:nvSpPr>
+        <p:spPr>
+          <a:xfrm>
+            <a:off x="457200" y="274320"/>
+            <a:ext cx="8229600" cy="457200"/>
+          </a:xfrm>
+          <a:prstGeom prst="rect">
+            <a:avLst/>
+          </a:prstGeom>
+          <a:noFill/>
+        </p:spPr>
+        <p:txBody>
+          <a:bodyPr wrap="none">
+            <a:spAutoFit/>
+          </a:bodyPr>
+          <a:lstStyle/>
+          <a:p>
+            <a:pPr>
+              <a:defRPr sz="3200" b="1"/>
+            </a:pPr>
+            <a:r>
+              <a:t>Instrumentation Query #2: Order Book State</a:t>
+            </a:r>
+          </a:p>
+        </p:txBody>
+      </p:sp>
+      <p:sp>
+        <p:nvSpPr>
+          <p:cNvPr id="4" name="TextBox 3"/>
+          <p:cNvSpPr txBox="1"/>
+          <p:nvPr/>
+        </p:nvSpPr>
+        <p:spPr>
+          <a:xfrm>
+            <a:off x="457200" y="914400"/>
+            <a:ext cx="8229600" cy="5029200"/>
+          </a:xfrm>
+          <a:prstGeom prst="rect">
+            <a:avLst/>
+          </a:prstGeom>
+          <a:solidFill>
+            <a:srgbClr val="F5F5F5"/>
+          </a:solidFill>
+        </p:spPr>
+        <p:txBody>
+          <a:bodyPr wrap="square">
+            <a:spAutoFit/>
+          </a:bodyPr>
+          <a:lstStyle/>
+          <a:p>
+            <a:pPr>
+              <a:defRPr sz="1100">
+                <a:latin typeface="Courier New"/>
+              </a:defRPr>
+            </a:pPr>
+            <a:r>
+              <a:t>Question: "What was the order book state after order VQ6EAOKbQdSnFkRmVUQAAw?"</a:t>
+            </a:r>
+            <a:br/>
+            <a:br/>
+            <a:r>
+              <a:t>Answer from RAG Pipeline (/instr):</a:t>
+            </a:r>
+            <a:br/>
+            <a:br/>
+            <a:r>
+              <a:t>After processing order VQ6EAOKbQdSnFkRmVUQAAw (SELL LIMIT, 8 units at 100.55),</a:t>
+            </a:r>
+            <a:br/>
+            <a:r>
+              <a:t>the SNAPSHOT event shows:</a:t>
+            </a:r>
+            <a:br/>
+            <a:br/>
+            <a:r>
+              <a:t>Buy Side (descending by price):</a:t>
+            </a:r>
+            <a:br/>
+            <a:r>
+              <a:t>  • 100.60: Order VQ6EAOKbQdSnFkRmVUQAAg with 7 units remaining</a:t>
+            </a:r>
+            <a:br/>
+            <a:r>
+              <a:t>    (originally 15, partially filled by VQ6EAOKbQdSnFkRmVUQAAw)</a:t>
+            </a:r>
+            <a:br/>
+            <a:r>
+              <a:t>  • 100.50: Order VQ6EAOKbQdSnFkRmVUQAAA with 10 units</a:t>
+            </a:r>
+            <a:br/>
+            <a:r>
+              <a:t>    (resting since first order, no matches yet)</a:t>
+            </a:r>
+            <a:br/>
+            <a:br/>
+            <a:r>
+              <a:t>Sell Side (ascending by price):</a:t>
+            </a:r>
+            <a:br/>
+            <a:r>
+              <a:t>  • 100.75: Order VQ6EAOKbQdSnFkRmVUQAAQ with 5 units</a:t>
+            </a:r>
+            <a:br/>
+            <a:r>
+              <a:t>    (resting, waiting for buyers at that price)</a:t>
+            </a:r>
+            <a:br/>
+            <a:br/>
+            <a:r>
+              <a:t>Key Insight: Order VQ6EAOKbQdSnFkRmVUQAAw fully executed against the</a:t>
+            </a:r>
+            <a:br/>
+            <a:r>
+              <a:t>best buy order (VQ6EAOKbQdSnFkRmVUQAAg at 100.60) because 100.60 ≥ 100.55.</a:t>
+            </a:r>
+            <a:br/>
+            <a:r>
+              <a:t>The seller got better price than their limit!</a:t>
             </a:r>
           </a:p>
         </p:txBody>
@@ -3649,7 +3709,7 @@
               <a:defRPr sz="3200" b="1"/>
             </a:pPr>
             <a:r>
-              <a:t>Sample RAG Query: Combined Analysis</a:t>
+              <a:t>Instrumentation Query #3: Function Call Trace</a:t>
             </a:r>
           </a:p>
         </p:txBody>
@@ -3684,70 +3744,63 @@
               </a:defRPr>
             </a:pPr>
             <a:r>
-              <a:t>Query: "Explain order VQ6EAOKbQdSnFkRmVUQAAw processing"</a:t>
-            </a:r>
-            <a:br/>
-            <a:br/>
-            <a:r>
-              <a:t>Step 1: Query Instrumentation Index</a:t>
-            </a:r>
-            <a:br/>
-            <a:r>
-              <a:t>→ Finds: ORDER_IN, CALL events, EXEC_REPORT, BOOK_ADD, SNAPSHOT</a:t>
-            </a:r>
-            <a:br/>
-            <a:r>
-              <a:t>→ Result: "Order was a SELL LIMIT for 8 units at 100.60,</a:t>
-            </a:r>
-            <a:br/>
-            <a:r>
-              <a:t>   fully filled against existing buy order"</a:t>
-            </a:r>
-            <a:br/>
-            <a:br/>
-            <a:r>
-              <a:t>Step 2: Query Code Index</a:t>
-            </a:r>
-            <a:br/>
-            <a:r>
-              <a:t>→ Finds: MatchingEngine.addOrder(), OrderBook.matchAgainstSide()</a:t>
-            </a:r>
-            <a:br/>
-            <a:r>
-              <a:t>→ Result: "addOrder() calls matchAgainstSide() which iterates</a:t>
-            </a:r>
-            <a:br/>
-            <a:r>
-              <a:t>   through opposite side price levels..."</a:t>
-            </a:r>
-            <a:br/>
-            <a:br/>
-            <a:r>
-              <a:t>Step 3: Synthesize with Claude</a:t>
-            </a:r>
-            <a:br/>
-            <a:r>
-              <a:t>→ Combines both contexts</a:t>
-            </a:r>
-            <a:br/>
-            <a:r>
-              <a:t>→ Result: "Order VQ6EAOKbQdSnFkRmVUQAAw was a SELL LIMIT order.</a:t>
-            </a:r>
-            <a:br/>
-            <a:r>
-              <a:t>   The MatchingEngine.addOrder() method (UUID: 8KGyw9TlT1prfI2eDxorPA)</a:t>
-            </a:r>
-            <a:br/>
-            <a:r>
-              <a:t>   received it and called matchAgainstSide() to find matching buy orders.</a:t>
-            </a:r>
-            <a:br/>
-            <a:r>
-              <a:t>   It matched against order VQ6EAOKbQdSnFkRmVUQAAA at price 100.60,</a:t>
-            </a:r>
-            <a:br/>
-            <a:r>
-              <a:t>   resulting in a FULL_FILL execution report with 8 units traded."</a:t>
+              <a:t>Question: "What functions were called when processing order VQ6EAOKbQdSnFkRmVUQAAw?"</a:t>
+            </a:r>
+            <a:br/>
+            <a:br/>
+            <a:r>
+              <a:t>Answer from RAG Pipeline (/instr):</a:t>
+            </a:r>
+            <a:br/>
+            <a:br/>
+            <a:r>
+              <a:t>Call Stack Trace (indentation shows call depth):</a:t>
+            </a:r>
+            <a:br/>
+            <a:br/>
+            <a:r>
+              <a:t>1. addOrder (8KGyw9TlT1prfI2eDxorPA) - Entry point</a:t>
+            </a:r>
+            <a:br/>
+            <a:r>
+              <a:t>  2. matchSellOrder (ssPU5fanS1yNng8aKzxNXg) - Match against buy side</a:t>
+            </a:r>
+            <a:br/>
+            <a:r>
+              <a:t>    3. getBestBuy (qbDB0uP0Slt8jZ4PGis8TQ) - Get best bid</a:t>
+            </a:r>
+            <a:br/>
+            <a:r>
+              <a:t>    3. executeMatch (w9Tl9qe4TF2eDxorPE1ebw) - Execute the trade</a:t>
+            </a:r>
+            <a:br/>
+            <a:r>
+              <a:t>      4. recordExecutionReport (5_al9qe4TF2eDxorPE1eaw) - Record seller report</a:t>
+            </a:r>
+            <a:br/>
+            <a:r>
+              <a:t>        → EXEC_REPORT: VQ6EAOKbQdSnFkRmVUQAAw FULL_FILL 8@100.60</a:t>
+            </a:r>
+            <a:br/>
+            <a:r>
+              <a:t>      4. recordExecutionReport (5_al9qe4TF2eDxorPE1eaw) - Record buyer report</a:t>
+            </a:r>
+            <a:br/>
+            <a:r>
+              <a:t>        → EXEC_REPORT: VQ6EAOKbQdSnFkRmVUQAAg PARTIAL_FILL 8@100.60</a:t>
+            </a:r>
+            <a:br/>
+            <a:r>
+              <a:t>  → SNAPSHOT: Updated order book state</a:t>
+            </a:r>
+            <a:br/>
+            <a:br/>
+            <a:r>
+              <a:t>The function UUIDs map to specific methods via @FunctionMetadata annotations.</a:t>
+            </a:r>
+            <a:br/>
+            <a:r>
+              <a:t>This trace shows the complete execution path through the matching engine.</a:t>
             </a:r>
           </a:p>
         </p:txBody>
@@ -3784,82 +3837,149 @@
         <p:txBody>
           <a:bodyPr/>
           <a:lstStyle/>
-          <a:p>
-            <a:r>
-              <a:t>Use Cases &amp; Benefits</a:t>
-            </a:r>
-          </a:p>
-        </p:txBody>
-      </p:sp>
-      <p:sp>
-        <p:nvSpPr>
-          <p:cNvPr id="3" name="Content Placeholder 2"/>
-          <p:cNvSpPr>
-            <a:spLocks noGrp="1"/>
-          </p:cNvSpPr>
-          <p:nvPr>
-            <p:ph idx="1"/>
-          </p:nvPr>
-        </p:nvSpPr>
-        <p:spPr/>
-        <p:txBody>
-          <a:bodyPr/>
-          <a:lstStyle/>
           <a:p/>
-          <a:p>
-            <a:pPr>
-              <a:defRPr sz="1800"/>
-            </a:pPr>
-            <a:r>
-              <a:t>Debugging: Trace order execution paths with AI assistance</a:t>
-            </a:r>
-          </a:p>
-          <a:p>
-            <a:pPr>
-              <a:defRPr sz="1800"/>
-            </a:pPr>
-            <a:r>
-              <a:t>Auditing: Query historical execution patterns and anomalies</a:t>
-            </a:r>
-          </a:p>
-          <a:p>
-            <a:pPr>
-              <a:defRPr sz="1800"/>
-            </a:pPr>
-            <a:r>
-              <a:t>Education: Learn how matching engines work through examples</a:t>
-            </a:r>
-          </a:p>
-          <a:p>
-            <a:pPr>
-              <a:defRPr sz="1800"/>
-            </a:pPr>
-            <a:r>
-              <a:t>Documentation: Natural language search through code and logs</a:t>
-            </a:r>
-          </a:p>
-          <a:p>
-            <a:pPr>
-              <a:defRPr sz="1800"/>
-            </a:pPr>
-            <a:r>
-              <a:t>Performance Analysis: Identify bottlenecks from execution traces</a:t>
-            </a:r>
-          </a:p>
-          <a:p>
-            <a:pPr>
-              <a:defRPr sz="1800"/>
-            </a:pPr>
-            <a:r>
-              <a:t>Compliance: Answer regulatory questions about order handling</a:t>
-            </a:r>
-          </a:p>
-          <a:p>
-            <a:pPr>
-              <a:defRPr sz="1800"/>
-            </a:pPr>
-            <a:r>
-              <a:t>Testing: Verify behavior matches implementation expectations</a:t>
+        </p:txBody>
+      </p:sp>
+      <p:sp>
+        <p:nvSpPr>
+          <p:cNvPr id="3" name="TextBox 2"/>
+          <p:cNvSpPr txBox="1"/>
+          <p:nvPr/>
+        </p:nvSpPr>
+        <p:spPr>
+          <a:xfrm>
+            <a:off x="457200" y="274320"/>
+            <a:ext cx="8229600" cy="457200"/>
+          </a:xfrm>
+          <a:prstGeom prst="rect">
+            <a:avLst/>
+          </a:prstGeom>
+          <a:noFill/>
+        </p:spPr>
+        <p:txBody>
+          <a:bodyPr wrap="none">
+            <a:spAutoFit/>
+          </a:bodyPr>
+          <a:lstStyle/>
+          <a:p>
+            <a:pPr>
+              <a:defRPr sz="3200" b="1"/>
+            </a:pPr>
+            <a:r>
+              <a:t>Code Query #1: Matching Algorithm</a:t>
+            </a:r>
+          </a:p>
+        </p:txBody>
+      </p:sp>
+      <p:sp>
+        <p:nvSpPr>
+          <p:cNvPr id="4" name="TextBox 3"/>
+          <p:cNvSpPr txBox="1"/>
+          <p:nvPr/>
+        </p:nvSpPr>
+        <p:spPr>
+          <a:xfrm>
+            <a:off x="457200" y="914400"/>
+            <a:ext cx="8229600" cy="5029200"/>
+          </a:xfrm>
+          <a:prstGeom prst="rect">
+            <a:avLst/>
+          </a:prstGeom>
+          <a:solidFill>
+            <a:srgbClr val="F5F5F5"/>
+          </a:solidFill>
+        </p:spPr>
+        <p:txBody>
+          <a:bodyPr wrap="square">
+            <a:spAutoFit/>
+          </a:bodyPr>
+          <a:lstStyle/>
+          <a:p>
+            <a:pPr>
+              <a:defRPr sz="1100">
+                <a:latin typeface="Courier New"/>
+              </a:defRPr>
+            </a:pPr>
+            <a:r>
+              <a:t>Question: "How does the price-time priority matching algorithm work?"</a:t>
+            </a:r>
+            <a:br/>
+            <a:br/>
+            <a:r>
+              <a:t>Answer from RAG Pipeline (/code):</a:t>
+            </a:r>
+            <a:br/>
+            <a:br/>
+            <a:r>
+              <a:t>The matching engine implements price-time priority through a two-level structure:</a:t>
+            </a:r>
+            <a:br/>
+            <a:br/>
+            <a:r>
+              <a:t>1. Price Priority (TreeMap):</a:t>
+            </a:r>
+            <a:br/>
+            <a:r>
+              <a:t>   • Buy side: TreeMap with DESCENDING order (highest price first)</a:t>
+            </a:r>
+            <a:br/>
+            <a:r>
+              <a:t>   • Sell side: TreeMap with ASCENDING order (lowest price first)</a:t>
+            </a:r>
+            <a:br/>
+            <a:r>
+              <a:t>   • This ensures best bid/ask are always at firstEntry()</a:t>
+            </a:r>
+            <a:br/>
+            <a:br/>
+            <a:r>
+              <a:t>2. Time Priority (LinkedList):</a:t>
+            </a:r>
+            <a:br/>
+            <a:r>
+              <a:t>   • Each price level contains a LinkedList&lt;Order&gt;</a:t>
+            </a:r>
+            <a:br/>
+            <a:r>
+              <a:t>   • Orders are added to the tail, removed from the head (FIFO)</a:t>
+            </a:r>
+            <a:br/>
+            <a:r>
+              <a:t>   • First order at a price level gets matched first</a:t>
+            </a:r>
+            <a:br/>
+            <a:br/>
+            <a:r>
+              <a:t>Matching Logic (from MatchingEngine.executeMatch):</a:t>
+            </a:r>
+            <a:br/>
+            <a:r>
+              <a:t>   long fillQuantity = Math.min(</a:t>
+            </a:r>
+            <a:br/>
+            <a:r>
+              <a:t>       incomingOrder.getRemainingQuantity(),</a:t>
+            </a:r>
+            <a:br/>
+            <a:r>
+              <a:t>       restingOrder.getRemainingQuantity()</a:t>
+            </a:r>
+            <a:br/>
+            <a:r>
+              <a:t>   );</a:t>
+            </a:r>
+            <a:br/>
+            <a:r>
+              <a:t>   // Execute at resting order's price (maker price advantage)</a:t>
+            </a:r>
+            <a:br/>
+            <a:r>
+              <a:t>   BigDecimal executionPrice = restingOrder.getPrice();</a:t>
+            </a:r>
+            <a:br/>
+            <a:br/>
+            <a:r>
+              <a:t>This ensures: Best prices matched first, then earliest orders within each price.</a:t>
             </a:r>
           </a:p>
         </p:txBody>
@@ -3896,90 +4016,150 @@
         <p:txBody>
           <a:bodyPr/>
           <a:lstStyle/>
-          <a:p>
-            <a:r>
-              <a:t>Technology Stack</a:t>
-            </a:r>
-          </a:p>
-        </p:txBody>
-      </p:sp>
-      <p:sp>
-        <p:nvSpPr>
-          <p:cNvPr id="3" name="Content Placeholder 2"/>
-          <p:cNvSpPr>
-            <a:spLocks noGrp="1"/>
-          </p:cNvSpPr>
-          <p:nvPr>
-            <p:ph idx="1"/>
-          </p:nvPr>
-        </p:nvSpPr>
-        <p:spPr/>
-        <p:txBody>
-          <a:bodyPr/>
-          <a:lstStyle/>
           <a:p/>
-          <a:p>
-            <a:pPr>
-              <a:defRPr sz="1800"/>
-            </a:pPr>
-            <a:r>
-              <a:t>Core Engine: Java 17, Maven</a:t>
-            </a:r>
-          </a:p>
-          <a:p>
-            <a:pPr>
-              <a:defRPr sz="1800"/>
-            </a:pPr>
-            <a:r>
-              <a:t>Data Structures: TreeMap (order book), LinkedList (FIFO)</a:t>
-            </a:r>
-          </a:p>
-          <a:p>
-            <a:pPr>
-              <a:defRPr sz="1800"/>
-            </a:pPr>
-            <a:r>
-              <a:t>Instrumentation: Byte Buddy 1.14.11, Java Agent API</a:t>
-            </a:r>
-          </a:p>
-          <a:p>
-            <a:pPr>
-              <a:defRPr sz="1800"/>
-            </a:pPr>
-            <a:r>
-              <a:t>Build Tool: Maven 3.6+</a:t>
-            </a:r>
-          </a:p>
-          <a:p>
-            <a:pPr>
-              <a:defRPr sz="1800"/>
-            </a:pPr>
-            <a:r>
-              <a:t>RAG Framework: LlamaIndex 0.14+</a:t>
-            </a:r>
-          </a:p>
-          <a:p>
-            <a:pPr>
-              <a:defRPr sz="1800"/>
-            </a:pPr>
-            <a:r>
-              <a:t>LLM: Anthropic Claude Opus 4</a:t>
-            </a:r>
-          </a:p>
-          <a:p>
-            <a:pPr>
-              <a:defRPr sz="1800"/>
-            </a:pPr>
-            <a:r>
-              <a:t>Embeddings: OpenAI text-embedding-3-small</a:t>
-            </a:r>
-          </a:p>
-          <a:p>
-            <a:pPr>
-              <a:defRPr sz="1800"/>
-            </a:pPr>
-            <a:r>
-              <a:t>Language: Python 3.12+ for RAG pipeline</a:t>
+        </p:txBody>
+      </p:sp>
+      <p:sp>
+        <p:nvSpPr>
+          <p:cNvPr id="3" name="TextBox 2"/>
+          <p:cNvSpPr txBox="1"/>
+          <p:nvPr/>
+        </p:nvSpPr>
+        <p:spPr>
+          <a:xfrm>
+            <a:off x="457200" y="274320"/>
+            <a:ext cx="8229600" cy="457200"/>
+          </a:xfrm>
+          <a:prstGeom prst="rect">
+            <a:avLst/>
+          </a:prstGeom>
+          <a:noFill/>
+        </p:spPr>
+        <p:txBody>
+          <a:bodyPr wrap="none">
+            <a:spAutoFit/>
+          </a:bodyPr>
+          <a:lstStyle/>
+          <a:p>
+            <a:pPr>
+              <a:defRPr sz="3200" b="1"/>
+            </a:pPr>
+            <a:r>
+              <a:t>Code Query #2: Order Book Data Structure</a:t>
+            </a:r>
+          </a:p>
+        </p:txBody>
+      </p:sp>
+      <p:sp>
+        <p:nvSpPr>
+          <p:cNvPr id="4" name="TextBox 3"/>
+          <p:cNvSpPr txBox="1"/>
+          <p:nvPr/>
+        </p:nvSpPr>
+        <p:spPr>
+          <a:xfrm>
+            <a:off x="457200" y="914400"/>
+            <a:ext cx="8229600" cy="5029200"/>
+          </a:xfrm>
+          <a:prstGeom prst="rect">
+            <a:avLst/>
+          </a:prstGeom>
+          <a:solidFill>
+            <a:srgbClr val="F5F5F5"/>
+          </a:solidFill>
+        </p:spPr>
+        <p:txBody>
+          <a:bodyPr wrap="square">
+            <a:spAutoFit/>
+          </a:bodyPr>
+          <a:lstStyle/>
+          <a:p>
+            <a:pPr>
+              <a:defRPr sz="1100">
+                <a:latin typeface="Courier New"/>
+              </a:defRPr>
+            </a:pPr>
+            <a:r>
+              <a:t>Question: "Explain the OrderBook data structure and why TreeMap was chosen."</a:t>
+            </a:r>
+            <a:br/>
+            <a:br/>
+            <a:r>
+              <a:t>Answer from RAG Pipeline (/code):</a:t>
+            </a:r>
+            <a:br/>
+            <a:br/>
+            <a:r>
+              <a:t>OrderBook.java uses TreeMap for efficient price-level operations:</a:t>
+            </a:r>
+            <a:br/>
+            <a:br/>
+            <a:r>
+              <a:t>private final TreeMap&lt;BigDecimal, LinkedList&lt;Order&gt;&gt; buySide;</a:t>
+            </a:r>
+            <a:br/>
+            <a:r>
+              <a:t>private final TreeMap&lt;BigDecimal, LinkedList&lt;Order&gt;&gt; sellSide;</a:t>
+            </a:r>
+            <a:br/>
+            <a:br/>
+            <a:r>
+              <a:t>Constructor:</a:t>
+            </a:r>
+            <a:br/>
+            <a:r>
+              <a:t>  buySide = new TreeMap&lt;&gt;(Comparator.reverseOrder());  // Descending</a:t>
+            </a:r>
+            <a:br/>
+            <a:r>
+              <a:t>  sellSide = new TreeMap&lt;&gt;();  // Natural ascending order</a:t>
+            </a:r>
+            <a:br/>
+            <a:br/>
+            <a:r>
+              <a:t>Why TreeMap?</a:t>
+            </a:r>
+            <a:br/>
+            <a:r>
+              <a:t>  • O(log n) insertion, deletion, and search</a:t>
+            </a:r>
+            <a:br/>
+            <a:r>
+              <a:t>  • firstEntry() gives best bid/ask in O(log n)</a:t>
+            </a:r>
+            <a:br/>
+            <a:r>
+              <a:t>  • Maintains sorted order automatically</a:t>
+            </a:r>
+            <a:br/>
+            <a:r>
+              <a:t>  • Efficient range queries for price levels</a:t>
+            </a:r>
+            <a:br/>
+            <a:br/>
+            <a:r>
+              <a:t>Why LinkedList for each price level?</a:t>
+            </a:r>
+            <a:br/>
+            <a:r>
+              <a:t>  • O(1) insertion at tail (add new order)</a:t>
+            </a:r>
+            <a:br/>
+            <a:r>
+              <a:t>  • O(1) removal from head (match oldest order)</a:t>
+            </a:r>
+            <a:br/>
+            <a:r>
+              <a:t>  • Preserves time priority (FIFO) within price level</a:t>
+            </a:r>
+            <a:br/>
+            <a:r>
+              <a:t>  • No random access needed</a:t>
+            </a:r>
+            <a:br/>
+            <a:br/>
+            <a:r>
+              <a:t>This combination provides optimal performance for matching operations.</a:t>
             </a:r>
           </a:p>
         </p:txBody>
@@ -4016,82 +4196,165 @@
         <p:txBody>
           <a:bodyPr/>
           <a:lstStyle/>
-          <a:p>
-            <a:r>
-              <a:t>Key Innovations</a:t>
-            </a:r>
-          </a:p>
-        </p:txBody>
-      </p:sp>
-      <p:sp>
-        <p:nvSpPr>
-          <p:cNvPr id="3" name="Content Placeholder 2"/>
-          <p:cNvSpPr>
-            <a:spLocks noGrp="1"/>
-          </p:cNvSpPr>
-          <p:nvPr>
-            <p:ph idx="1"/>
-          </p:nvPr>
-        </p:nvSpPr>
-        <p:spPr/>
-        <p:txBody>
-          <a:bodyPr/>
-          <a:lstStyle/>
           <a:p/>
-          <a:p>
-            <a:pPr>
-              <a:defRPr sz="1800"/>
-            </a:pPr>
-            <a:r>
-              <a:t>UUID-Based Function Identification: Stable across refactoring</a:t>
-            </a:r>
-          </a:p>
-          <a:p>
-            <a:pPr>
-              <a:defRPr sz="1800"/>
-            </a:pPr>
-            <a:r>
-              <a:t>Metadata-Driven Instrumentation: Self-documenting code</a:t>
-            </a:r>
-          </a:p>
-          <a:p>
-            <a:pPr>
-              <a:defRPr sz="1800"/>
-            </a:pPr>
-            <a:r>
-              <a:t>Zero-Overhead Instrumentation: Agent can be disabled in production</a:t>
-            </a:r>
-          </a:p>
-          <a:p>
-            <a:pPr>
-              <a:defRPr sz="1800"/>
-            </a:pPr>
-            <a:r>
-              <a:t>Dual-Index RAG: Query both 'what happened' and 'how it works'</a:t>
-            </a:r>
-          </a:p>
-          <a:p>
-            <a:pPr>
-              <a:defRPr sz="1800"/>
-            </a:pPr>
-            <a:r>
-              <a:t>Context Propagation: Thread-local order ID tracking</a:t>
-            </a:r>
-          </a:p>
-          <a:p>
-            <a:pPr>
-              <a:defRPr sz="1800"/>
-            </a:pPr>
-            <a:r>
-              <a:t>Semantic Search: Natural language queries on technical content</a:t>
-            </a:r>
-          </a:p>
-          <a:p>
-            <a:pPr>
-              <a:defRPr sz="1800"/>
-            </a:pPr>
-            <a:r>
-              <a:t>Base64 UUID Encoding: Compact 22-character identifiers</a:t>
+        </p:txBody>
+      </p:sp>
+      <p:sp>
+        <p:nvSpPr>
+          <p:cNvPr id="3" name="TextBox 2"/>
+          <p:cNvSpPr txBox="1"/>
+          <p:nvPr/>
+        </p:nvSpPr>
+        <p:spPr>
+          <a:xfrm>
+            <a:off x="457200" y="274320"/>
+            <a:ext cx="8229600" cy="457200"/>
+          </a:xfrm>
+          <a:prstGeom prst="rect">
+            <a:avLst/>
+          </a:prstGeom>
+          <a:noFill/>
+        </p:spPr>
+        <p:txBody>
+          <a:bodyPr wrap="none">
+            <a:spAutoFit/>
+          </a:bodyPr>
+          <a:lstStyle/>
+          <a:p>
+            <a:pPr>
+              <a:defRPr sz="3200" b="1"/>
+            </a:pPr>
+            <a:r>
+              <a:t>Code Query #3: @FunctionMetadata Annotation</a:t>
+            </a:r>
+          </a:p>
+        </p:txBody>
+      </p:sp>
+      <p:sp>
+        <p:nvSpPr>
+          <p:cNvPr id="4" name="TextBox 3"/>
+          <p:cNvSpPr txBox="1"/>
+          <p:nvPr/>
+        </p:nvSpPr>
+        <p:spPr>
+          <a:xfrm>
+            <a:off x="457200" y="914400"/>
+            <a:ext cx="8229600" cy="5029200"/>
+          </a:xfrm>
+          <a:prstGeom prst="rect">
+            <a:avLst/>
+          </a:prstGeom>
+          <a:solidFill>
+            <a:srgbClr val="F5F5F5"/>
+          </a:solidFill>
+        </p:spPr>
+        <p:txBody>
+          <a:bodyPr wrap="square">
+            <a:spAutoFit/>
+          </a:bodyPr>
+          <a:lstStyle/>
+          <a:p>
+            <a:pPr>
+              <a:defRPr sz="1100">
+                <a:latin typeface="Courier New"/>
+              </a:defRPr>
+            </a:pPr>
+            <a:r>
+              <a:t>Question: "What is the @FunctionMetadata annotation and how is it used?"</a:t>
+            </a:r>
+            <a:br/>
+            <a:br/>
+            <a:r>
+              <a:t>Answer from RAG Pipeline (/code):</a:t>
+            </a:r>
+            <a:br/>
+            <a:br/>
+            <a:r>
+              <a:t>@FunctionMetadata is a custom annotation defined in the codebase:</a:t>
+            </a:r>
+            <a:br/>
+            <a:br/>
+            <a:r>
+              <a:t>@Retention(RetentionPolicy.RUNTIME)  // Available at runtime</a:t>
+            </a:r>
+            <a:br/>
+            <a:r>
+              <a:t>@Target(ElementType.METHOD)          // Applied to methods</a:t>
+            </a:r>
+            <a:br/>
+            <a:r>
+              <a:t>public @interface FunctionMetadata {</a:t>
+            </a:r>
+            <a:br/>
+            <a:r>
+              <a:t>    String uuid();          // Unique Base64-encoded identifier</a:t>
+            </a:r>
+            <a:br/>
+            <a:r>
+              <a:t>    String functionName();  // Human-readable name</a:t>
+            </a:r>
+            <a:br/>
+            <a:r>
+              <a:t>    String description();   // Detailed business logic description</a:t>
+            </a:r>
+            <a:br/>
+            <a:r>
+              <a:t>}</a:t>
+            </a:r>
+            <a:br/>
+            <a:br/>
+            <a:r>
+              <a:t>Usage Example (from MatchingEngine.java):</a:t>
+            </a:r>
+            <a:br/>
+            <a:br/>
+            <a:r>
+              <a:t>@FunctionMetadata(</a:t>
+            </a:r>
+            <a:br/>
+            <a:r>
+              <a:t>    uuid = "w9Tl9qe4TF2eDxorPE1ebw",</a:t>
+            </a:r>
+            <a:br/>
+            <a:r>
+              <a:t>    functionName = "executeMatch",</a:t>
+            </a:r>
+            <a:br/>
+            <a:r>
+              <a:t>    description = "Executes a trade between an incoming order and a</a:t>
+            </a:r>
+            <a:br/>
+            <a:r>
+              <a:t>                   resting order, generating execution reports..."</a:t>
+            </a:r>
+            <a:br/>
+            <a:r>
+              <a:t>)</a:t>
+            </a:r>
+            <a:br/>
+            <a:r>
+              <a:t>private void executeMatch(Order incomingOrder, Order restingOrder)</a:t>
+            </a:r>
+            <a:br/>
+            <a:br/>
+            <a:r>
+              <a:t>Benefits:</a:t>
+            </a:r>
+            <a:br/>
+            <a:r>
+              <a:t>  • Runtime introspection for instrumentation agent</a:t>
+            </a:r>
+            <a:br/>
+            <a:r>
+              <a:t>  • Stable UUID identification across refactoring</a:t>
+            </a:r>
+            <a:br/>
+            <a:r>
+              <a:t>  • Self-documenting code with business logic descriptions</a:t>
+            </a:r>
+            <a:br/>
+            <a:r>
+              <a:t>  • Enables automatic function metadata export to logs</a:t>
             </a:r>
           </a:p>
         </p:txBody>
@@ -4128,82 +4391,147 @@
         <p:txBody>
           <a:bodyPr/>
           <a:lstStyle/>
-          <a:p>
-            <a:r>
-              <a:t>Demo: End-to-End Workflow</a:t>
-            </a:r>
-          </a:p>
-        </p:txBody>
-      </p:sp>
-      <p:sp>
-        <p:nvSpPr>
-          <p:cNvPr id="3" name="Content Placeholder 2"/>
-          <p:cNvSpPr>
-            <a:spLocks noGrp="1"/>
-          </p:cNvSpPr>
-          <p:nvPr>
-            <p:ph idx="1"/>
-          </p:nvPr>
-        </p:nvSpPr>
-        <p:spPr/>
-        <p:txBody>
-          <a:bodyPr/>
-          <a:lstStyle/>
           <a:p/>
-          <a:p>
-            <a:pPr>
-              <a:defRPr sz="1800"/>
-            </a:pPr>
-            <a:r>
-              <a:t>1. Add orders to orders.csv (BUY/SELL, LIMIT/MARKET)</a:t>
-            </a:r>
-          </a:p>
-          <a:p>
-            <a:pPr>
-              <a:defRPr sz="1800"/>
-            </a:pPr>
-            <a:r>
-              <a:t>2. Run matching engine with instrumentation agent</a:t>
-            </a:r>
-          </a:p>
-          <a:p>
-            <a:pPr>
-              <a:defRPr sz="1800"/>
-            </a:pPr>
-            <a:r>
-              <a:t>3. Generate executions.csv with trade results</a:t>
-            </a:r>
-          </a:p>
-          <a:p>
-            <a:pPr>
-              <a:defRPr sz="1800"/>
-            </a:pPr>
-            <a:r>
-              <a:t>4. Generate instrumentation.log with detailed traces</a:t>
-            </a:r>
-          </a:p>
-          <a:p>
-            <a:pPr>
-              <a:defRPr sz="1800"/>
-            </a:pPr>
-            <a:r>
-              <a:t>5. Start RAG pipeline: python3 rag_query.py</a:t>
-            </a:r>
-          </a:p>
-          <a:p>
-            <a:pPr>
-              <a:defRPr sz="1800"/>
-            </a:pPr>
-            <a:r>
-              <a:t>6. Ask questions about execution and implementation</a:t>
-            </a:r>
-          </a:p>
-          <a:p>
-            <a:pPr>
-              <a:defRPr sz="1800"/>
-            </a:pPr>
-            <a:r>
-              <a:t>7. Get AI-powered answers with code and log context</a:t>
+        </p:txBody>
+      </p:sp>
+      <p:sp>
+        <p:nvSpPr>
+          <p:cNvPr id="3" name="TextBox 2"/>
+          <p:cNvSpPr txBox="1"/>
+          <p:nvPr/>
+        </p:nvSpPr>
+        <p:spPr>
+          <a:xfrm>
+            <a:off x="457200" y="274320"/>
+            <a:ext cx="8229600" cy="457200"/>
+          </a:xfrm>
+          <a:prstGeom prst="rect">
+            <a:avLst/>
+          </a:prstGeom>
+          <a:noFill/>
+        </p:spPr>
+        <p:txBody>
+          <a:bodyPr wrap="none">
+            <a:spAutoFit/>
+          </a:bodyPr>
+          <a:lstStyle/>
+          <a:p>
+            <a:pPr>
+              <a:defRPr sz="3200" b="1"/>
+            </a:pPr>
+            <a:r>
+              <a:t>Combined Query #1: Order Processing Deep Dive</a:t>
+            </a:r>
+          </a:p>
+        </p:txBody>
+      </p:sp>
+      <p:sp>
+        <p:nvSpPr>
+          <p:cNvPr id="4" name="TextBox 3"/>
+          <p:cNvSpPr txBox="1"/>
+          <p:nvPr/>
+        </p:nvSpPr>
+        <p:spPr>
+          <a:xfrm>
+            <a:off x="457200" y="914400"/>
+            <a:ext cx="8229600" cy="5029200"/>
+          </a:xfrm>
+          <a:prstGeom prst="rect">
+            <a:avLst/>
+          </a:prstGeom>
+          <a:solidFill>
+            <a:srgbClr val="F5F5F5"/>
+          </a:solidFill>
+        </p:spPr>
+        <p:txBody>
+          <a:bodyPr wrap="square">
+            <a:spAutoFit/>
+          </a:bodyPr>
+          <a:lstStyle/>
+          <a:p>
+            <a:pPr>
+              <a:defRPr sz="1100">
+                <a:latin typeface="Courier New"/>
+              </a:defRPr>
+            </a:pPr>
+            <a:r>
+              <a:t>Question: "Explain exactly how order VQ6EAOKbQdSnFkRmVUQAAw was processed."</a:t>
+            </a:r>
+            <a:br/>
+            <a:br/>
+            <a:r>
+              <a:t>Answer from RAG Pipeline (/both - Synthesized):</a:t>
+            </a:r>
+            <a:br/>
+            <a:br/>
+            <a:r>
+              <a:t>Order Details (from instrumentation):</a:t>
+            </a:r>
+            <a:br/>
+            <a:r>
+              <a:t>  • VQ6EAOKbQdSnFkRmVUQAAw: SELL LIMIT, 8 units at 100.55</a:t>
+            </a:r>
+            <a:br/>
+            <a:br/>
+            <a:r>
+              <a:t>Processing Flow (combining code + logs):</a:t>
+            </a:r>
+            <a:br/>
+            <a:br/>
+            <a:r>
+              <a:t>1. Entry (MatchingEngine.addOrder - UUID: 8KGyw9TlT1prfI2eDxorPA):</a:t>
+            </a:r>
+            <a:br/>
+            <a:r>
+              <a:t>   Code shows: Routes SELL orders to matchSellOrder()</a:t>
+            </a:r>
+            <a:br/>
+            <a:r>
+              <a:t>   Log shows: CALL event at 2026-02-16T00:52:31.403997Z</a:t>
+            </a:r>
+            <a:br/>
+            <a:br/>
+            <a:r>
+              <a:t>2. Matching (matchSellOrder - UUID: ssPU5fanS1yNng8aKzxNXg):</a:t>
+            </a:r>
+            <a:br/>
+            <a:r>
+              <a:t>   Code shows: Loops through buy side while remainingQty &gt; 0</a:t>
+            </a:r>
+            <a:br/>
+            <a:r>
+              <a:t>               Stops when best buy price &lt; sell limit price</a:t>
+            </a:r>
+            <a:br/>
+            <a:r>
+              <a:t>   Log shows: Called getBestBuy, found VQ6EAOKbQdSnFkRmVUQAAg at 100.60</a:t>
+            </a:r>
+            <a:br/>
+            <a:br/>
+            <a:r>
+              <a:t>3. Price Check: 100.60 (best buy) ≥ 100.55 (sell limit) → CAN MATCH</a:t>
+            </a:r>
+            <a:br/>
+            <a:br/>
+            <a:r>
+              <a:t>4. Execution (executeMatch - UUID: w9Tl9qe4TF2eDxorPE1ebw):</a:t>
+            </a:r>
+            <a:br/>
+            <a:r>
+              <a:t>   Code shows: fillQty = min(8, 15) = 8</a:t>
+            </a:r>
+            <a:br/>
+            <a:r>
+              <a:t>               executionPrice = 100.60 (resting order's price)</a:t>
+            </a:r>
+            <a:br/>
+            <a:r>
+              <a:t>   Log shows: Two EXEC_REPORT events generated</a:t>
+            </a:r>
+            <a:br/>
+            <a:br/>
+            <a:r>
+              <a:t>5. Result: Seller filled all 8 units at 100.60 (better than 100.55 limit!)</a:t>
             </a:r>
           </a:p>
         </p:txBody>
@@ -4269,7 +4597,7 @@
               <a:defRPr sz="3200" b="1"/>
             </a:pPr>
             <a:r>
-              <a:t>Example RAG Questions</a:t>
+              <a:t>Combined Query #2: Market Order Behavior</a:t>
             </a:r>
           </a:p>
         </p:txBody>
@@ -4304,69 +4632,92 @@
               </a:defRPr>
             </a:pPr>
             <a:r>
-              <a:t>Instrumentation Queries (/instr):</a:t>
-            </a:r>
-            <a:br/>
-            <a:r>
-              <a:t>• What orders were added to the order book?</a:t>
-            </a:r>
-            <a:br/>
-            <a:r>
-              <a:t>• Show execution reports for order VQ6EAOKbQdSnFkRmVUQAAA</a:t>
-            </a:r>
-            <a:br/>
-            <a:r>
-              <a:t>• What was the order book state after the second order?</a:t>
-            </a:r>
-            <a:br/>
-            <a:r>
-              <a:t>• Which function UUIDs were called during processing?</a:t>
-            </a:r>
-            <a:br/>
-            <a:br/>
-            <a:r>
-              <a:t>Code Queries (/code):</a:t>
-            </a:r>
-            <a:br/>
-            <a:r>
-              <a:t>• How does OrderBook.addOrder() work?</a:t>
-            </a:r>
-            <a:br/>
-            <a:r>
-              <a:t>• What is the ExecutionReport data structure?</a:t>
-            </a:r>
-            <a:br/>
-            <a:r>
-              <a:t>• Explain the matchAgainstSide() algorithm</a:t>
-            </a:r>
-            <a:br/>
-            <a:r>
-              <a:t>• What annotations are used in the codebase?</a:t>
-            </a:r>
-            <a:br/>
-            <a:br/>
-            <a:r>
-              <a:t>Combined Queries (/both):</a:t>
-            </a:r>
-            <a:br/>
-            <a:r>
-              <a:t>• Why did order X partially fill? (needs both logs + code)</a:t>
-            </a:r>
-            <a:br/>
-            <a:r>
-              <a:t>• How does the system handle market orders? (theory + practice)</a:t>
-            </a:r>
-            <a:br/>
-            <a:r>
-              <a:t>• Trace the execution path for order Y (logs + function code)</a:t>
-            </a:r>
-            <a:br/>
-            <a:r>
-              <a:t>• What is the difference between FULL_FILL and PARTIAL_FILL?</a:t>
-            </a:r>
-            <a:br/>
-            <a:r>
-              <a:t>  (code + examples)</a:t>
+              <a:t>Question: "Why did market order VQ6EAOKbQdSnFkRmVUQABA partially fill</a:t>
+            </a:r>
+            <a:br/>
+            <a:r>
+              <a:t>            then cancel?"</a:t>
+            </a:r>
+            <a:br/>
+            <a:br/>
+            <a:r>
+              <a:t>Answer from RAG Pipeline (/both - Synthesized):</a:t>
+            </a:r>
+            <a:br/>
+            <a:br/>
+            <a:r>
+              <a:t>Order Details:</a:t>
+            </a:r>
+            <a:br/>
+            <a:r>
+              <a:t>  • VQ6EAOKbQdSnFkRmVUQABA: BUY MARKET, 12 units, no price limit</a:t>
+            </a:r>
+            <a:br/>
+            <a:br/>
+            <a:r>
+              <a:t>Code Logic (MatchingEngine.matchBuyOrder):</a:t>
+            </a:r>
+            <a:br/>
+            <a:r>
+              <a:t>  For MARKET orders:</a:t>
+            </a:r>
+            <a:br/>
+            <a:r>
+              <a:t>    • Continue matching while remainingQuantity &gt; 0 AND sellSide not empty</a:t>
+            </a:r>
+            <a:br/>
+            <a:r>
+              <a:t>    • No price check (market orders accept any price)</a:t>
+            </a:r>
+            <a:br/>
+            <a:r>
+              <a:t>    • If unfilled after exhausting liquidity → CANCEL</a:t>
+            </a:r>
+            <a:br/>
+            <a:br/>
+            <a:r>
+              <a:t>Execution Trace (from logs):</a:t>
+            </a:r>
+            <a:br/>
+            <a:r>
+              <a:t>  1. sMHS4_SlS1yNng8aKzxNXg (getBestSell) → Found VQ6EAOKbQdSnFkRmVUQAAQ</a:t>
+            </a:r>
+            <a:br/>
+            <a:r>
+              <a:t>  2. executeMatch → Filled 5 units at 100.75</a:t>
+            </a:r>
+            <a:br/>
+            <a:r>
+              <a:t>     EXEC_REPORT: PARTIAL_FILL, cumQty=5, remaining=7</a:t>
+            </a:r>
+            <a:br/>
+            <a:r>
+              <a:t>  3. removeOrder (4_SltsfYTl8aKzxNXm96iw) → Removed fully filled sell order</a:t>
+            </a:r>
+            <a:br/>
+            <a:r>
+              <a:t>  4. sMHS4_SlS1yNng8aKzxNXg → No more sell orders (returns null)</a:t>
+            </a:r>
+            <a:br/>
+            <a:r>
+              <a:t>  5. recordExecutionReport → CANCEL with lastQty=7 (unfilled)</a:t>
+            </a:r>
+            <a:br/>
+            <a:br/>
+            <a:r>
+              <a:t>Why CANCEL?</a:t>
+            </a:r>
+            <a:br/>
+            <a:r>
+              <a:t>  Code shows: Market orders with remaining quantity log a warning and</a:t>
+            </a:r>
+            <a:br/>
+            <a:r>
+              <a:t>              generate CANCEL execution report (insufficient liquidity)</a:t>
+            </a:r>
+            <a:br/>
+            <a:r>
+              <a:t>  This prevents market orders from resting in the book.</a:t>
             </a:r>
           </a:p>
         </p:txBody>
@@ -4403,82 +4754,153 @@
         <p:txBody>
           <a:bodyPr/>
           <a:lstStyle/>
-          <a:p>
-            <a:r>
-              <a:t>Performance &amp; Scalability</a:t>
-            </a:r>
-          </a:p>
-        </p:txBody>
-      </p:sp>
-      <p:sp>
-        <p:nvSpPr>
-          <p:cNvPr id="3" name="Content Placeholder 2"/>
-          <p:cNvSpPr>
-            <a:spLocks noGrp="1"/>
-          </p:cNvSpPr>
-          <p:nvPr>
-            <p:ph idx="1"/>
-          </p:nvPr>
-        </p:nvSpPr>
-        <p:spPr/>
-        <p:txBody>
-          <a:bodyPr/>
-          <a:lstStyle/>
           <a:p/>
-          <a:p>
-            <a:pPr>
-              <a:defRPr sz="1800"/>
-            </a:pPr>
-            <a:r>
-              <a:t>Matching Engine: O(log n) order insertion/matching</a:t>
-            </a:r>
-          </a:p>
-          <a:p>
-            <a:pPr>
-              <a:defRPr sz="1800"/>
-            </a:pPr>
-            <a:r>
-              <a:t>Instrumentation: &lt;5% overhead when enabled, 0% when disabled</a:t>
-            </a:r>
-          </a:p>
-          <a:p>
-            <a:pPr>
-              <a:defRPr sz="1800"/>
-            </a:pPr>
-            <a:r>
-              <a:t>RAG Indexing: One-time cost, ~2 seconds for sample data</a:t>
-            </a:r>
-          </a:p>
-          <a:p>
-            <a:pPr>
-              <a:defRPr sz="1800"/>
-            </a:pPr>
-            <a:r>
-              <a:t>RAG Queries: 2-5 seconds depending on complexity</a:t>
-            </a:r>
-          </a:p>
-          <a:p>
-            <a:pPr>
-              <a:defRPr sz="1800"/>
-            </a:pPr>
-            <a:r>
-              <a:t>Embeddings: Cached locally, minimal API calls</a:t>
-            </a:r>
-          </a:p>
-          <a:p>
-            <a:pPr>
-              <a:defRPr sz="1800"/>
-            </a:pPr>
-            <a:r>
-              <a:t>LLM Costs: ~$0.01-0.05 per query (Claude Opus pricing)</a:t>
-            </a:r>
-          </a:p>
-          <a:p>
-            <a:pPr>
-              <a:defRPr sz="1800"/>
-            </a:pPr>
-            <a:r>
-              <a:t>Scalable: Can index thousands of log lines and source files</a:t>
+        </p:txBody>
+      </p:sp>
+      <p:sp>
+        <p:nvSpPr>
+          <p:cNvPr id="3" name="TextBox 2"/>
+          <p:cNvSpPr txBox="1"/>
+          <p:nvPr/>
+        </p:nvSpPr>
+        <p:spPr>
+          <a:xfrm>
+            <a:off x="457200" y="274320"/>
+            <a:ext cx="8229600" cy="457200"/>
+          </a:xfrm>
+          <a:prstGeom prst="rect">
+            <a:avLst/>
+          </a:prstGeom>
+          <a:noFill/>
+        </p:spPr>
+        <p:txBody>
+          <a:bodyPr wrap="none">
+            <a:spAutoFit/>
+          </a:bodyPr>
+          <a:lstStyle/>
+          <a:p>
+            <a:pPr>
+              <a:defRPr sz="3200" b="1"/>
+            </a:pPr>
+            <a:r>
+              <a:t>Combined Query #3: Price Improvement Analysis</a:t>
+            </a:r>
+          </a:p>
+        </p:txBody>
+      </p:sp>
+      <p:sp>
+        <p:nvSpPr>
+          <p:cNvPr id="4" name="TextBox 3"/>
+          <p:cNvSpPr txBox="1"/>
+          <p:nvPr/>
+        </p:nvSpPr>
+        <p:spPr>
+          <a:xfrm>
+            <a:off x="457200" y="914400"/>
+            <a:ext cx="8229600" cy="5029200"/>
+          </a:xfrm>
+          <a:prstGeom prst="rect">
+            <a:avLst/>
+          </a:prstGeom>
+          <a:solidFill>
+            <a:srgbClr val="F5F5F5"/>
+          </a:solidFill>
+        </p:spPr>
+        <p:txBody>
+          <a:bodyPr wrap="square">
+            <a:spAutoFit/>
+          </a:bodyPr>
+          <a:lstStyle/>
+          <a:p>
+            <a:pPr>
+              <a:defRPr sz="1100">
+                <a:latin typeface="Courier New"/>
+              </a:defRPr>
+            </a:pPr>
+            <a:r>
+              <a:t>Question: "Show me examples where orders got better prices than their limits."</a:t>
+            </a:r>
+            <a:br/>
+            <a:br/>
+            <a:r>
+              <a:t>Answer from RAG Pipeline (/both - Synthesized):</a:t>
+            </a:r>
+            <a:br/>
+            <a:br/>
+            <a:r>
+              <a:t>Price Improvement Mechanism (from code):</a:t>
+            </a:r>
+            <a:br/>
+            <a:r>
+              <a:t>  In executeMatch(), execution price = restingOrder.getPrice()</a:t>
+            </a:r>
+            <a:br/>
+            <a:r>
+              <a:t>  This gives "maker price advantage" - the resting order's price is used.</a:t>
+            </a:r>
+            <a:br/>
+            <a:br/>
+            <a:r>
+              <a:t>Example from Logs:</a:t>
+            </a:r>
+            <a:br/>
+            <a:br/>
+            <a:r>
+              <a:t>Order VQ6EAOKbQdSnFkRmVUQAAw:</a:t>
+            </a:r>
+            <a:br/>
+            <a:r>
+              <a:t>  • Placed: SELL LIMIT at 100.55 (willing to sell at this price or higher)</a:t>
+            </a:r>
+            <a:br/>
+            <a:r>
+              <a:t>  • Matched: Against buy order at 100.60</a:t>
+            </a:r>
+            <a:br/>
+            <a:r>
+              <a:t>  • Executed: At 100.60 (0.05 price improvement!)</a:t>
+            </a:r>
+            <a:br/>
+            <a:r>
+              <a:t>  • Reason: Buyer was resting at 100.60, so seller got the better price</a:t>
+            </a:r>
+            <a:br/>
+            <a:br/>
+            <a:r>
+              <a:t>Why This Happens:</a:t>
+            </a:r>
+            <a:br/>
+            <a:r>
+              <a:t>  Code (matchSellOrder): Checks if bestBuyPrice &gt;= sellLimitPrice</a:t>
+            </a:r>
+            <a:br/>
+            <a:r>
+              <a:t>  • If 100.60 &gt;= 100.55 → MATCH at 100.60 (resting buy order's price)</a:t>
+            </a:r>
+            <a:br/>
+            <a:r>
+              <a:t>  • Seller benefits from buyer's higher limit price</a:t>
+            </a:r>
+            <a:br/>
+            <a:r>
+              <a:t>  • This rewards liquidity providers (makers) over takers</a:t>
+            </a:r>
+            <a:br/>
+            <a:br/>
+            <a:r>
+              <a:t>Price-Time Priority:</a:t>
+            </a:r>
+            <a:br/>
+            <a:r>
+              <a:t>  1. Best prices matched first (price priority)</a:t>
+            </a:r>
+            <a:br/>
+            <a:r>
+              <a:t>  2. Within price level, oldest orders first (time priority)</a:t>
+            </a:r>
+            <a:br/>
+            <a:r>
+              <a:t>  3. Execution at resting order's price (maker advantage)</a:t>
             </a:r>
           </a:p>
         </p:txBody>
@@ -4621,7 +5043,7 @@
           <a:lstStyle/>
           <a:p>
             <a:r>
-              <a:t>Future Enhancements</a:t>
+              <a:t>RAG Query Capabilities Summary</a:t>
             </a:r>
           </a:p>
         </p:txBody>
@@ -4646,55 +5068,113 @@
               <a:defRPr sz="1800"/>
             </a:pPr>
             <a:r>
-              <a:t>Real-time streaming of instrumentation events</a:t>
-            </a:r>
-          </a:p>
-          <a:p>
-            <a:pPr>
-              <a:defRPr sz="1800"/>
-            </a:pPr>
-            <a:r>
-              <a:t>WebSocket-based live RAG queries during execution</a:t>
-            </a:r>
-          </a:p>
-          <a:p>
-            <a:pPr>
-              <a:defRPr sz="1800"/>
-            </a:pPr>
-            <a:r>
-              <a:t>Visual order book snapshots in RAG responses</a:t>
-            </a:r>
-          </a:p>
-          <a:p>
-            <a:pPr>
-              <a:defRPr sz="1800"/>
-            </a:pPr>
-            <a:r>
-              <a:t>Multi-symbol support with symbol-specific indices</a:t>
-            </a:r>
-          </a:p>
-          <a:p>
-            <a:pPr>
-              <a:defRPr sz="1800"/>
-            </a:pPr>
-            <a:r>
-              <a:t>Performance profiling integration (CPU, memory metrics)</a:t>
-            </a:r>
-          </a:p>
-          <a:p>
-            <a:pPr>
-              <a:defRPr sz="1800"/>
-            </a:pPr>
-            <a:r>
-              <a:t>Automated test generation from execution traces</a:t>
-            </a:r>
-          </a:p>
-          <a:p>
-            <a:pPr>
-              <a:defRPr sz="1800"/>
-            </a:pPr>
-            <a:r>
-              <a:t>Comparison queries: 'How did order X differ from order Y?'</a:t>
+              <a:t>Instrumentation Queries Answer:</a:t>
+            </a:r>
+          </a:p>
+          <a:p>
+            <a:pPr>
+              <a:defRPr sz="1800"/>
+            </a:pPr>
+            <a:r>
+              <a:t>  • What happened? (execution history, order flow)</a:t>
+            </a:r>
+          </a:p>
+          <a:p>
+            <a:pPr>
+              <a:defRPr sz="1800"/>
+            </a:pPr>
+            <a:r>
+              <a:t>  • When? (timestamps, sequence of events)</a:t>
+            </a:r>
+          </a:p>
+          <a:p>
+            <a:pPr>
+              <a:defRPr sz="1800"/>
+            </a:pPr>
+            <a:r>
+              <a:t>  • Who? (specific order IDs and their journey)</a:t>
+            </a:r>
+          </a:p>
+          <a:p>
+            <a:pPr>
+              <a:defRPr sz="1800"/>
+            </a:pPr>
+          </a:p>
+          <a:p>
+            <a:pPr>
+              <a:defRPr sz="1800"/>
+            </a:pPr>
+            <a:r>
+              <a:t>Code Queries Answer:</a:t>
+            </a:r>
+          </a:p>
+          <a:p>
+            <a:pPr>
+              <a:defRPr sz="1800"/>
+            </a:pPr>
+            <a:r>
+              <a:t>  • How does it work? (algorithms, data structures)</a:t>
+            </a:r>
+          </a:p>
+          <a:p>
+            <a:pPr>
+              <a:defRPr sz="1800"/>
+            </a:pPr>
+            <a:r>
+              <a:t>  • Why this design? (architecture decisions)</a:t>
+            </a:r>
+          </a:p>
+          <a:p>
+            <a:pPr>
+              <a:defRPr sz="1800"/>
+            </a:pPr>
+            <a:r>
+              <a:t>  • What are the rules? (business logic, validations)</a:t>
+            </a:r>
+          </a:p>
+          <a:p>
+            <a:pPr>
+              <a:defRPr sz="1800"/>
+            </a:pPr>
+          </a:p>
+          <a:p>
+            <a:pPr>
+              <a:defRPr sz="1800"/>
+            </a:pPr>
+            <a:r>
+              <a:t>Combined Queries Answer:</a:t>
+            </a:r>
+          </a:p>
+          <a:p>
+            <a:pPr>
+              <a:defRPr sz="1800"/>
+            </a:pPr>
+            <a:r>
+              <a:t>  • Why did X happen? (connect behavior to code)</a:t>
+            </a:r>
+          </a:p>
+          <a:p>
+            <a:pPr>
+              <a:defRPr sz="1800"/>
+            </a:pPr>
+            <a:r>
+              <a:t>  • Is the implementation correct? (verify against spec)</a:t>
+            </a:r>
+          </a:p>
+          <a:p>
+            <a:pPr>
+              <a:defRPr sz="1800"/>
+            </a:pPr>
+            <a:r>
+              <a:t>  • How would Y be different? (counterfactual analysis)</a:t>
+            </a:r>
+          </a:p>
+          <a:p>
+            <a:pPr>
+              <a:defRPr sz="1800"/>
+            </a:pPr>
+            <a:r>
+              <a:t>  • Teach me by example (theory + real execution traces)</a:t>
             </a:r>
           </a:p>
         </p:txBody>
@@ -4731,6 +5211,1224 @@
         <p:txBody>
           <a:bodyPr/>
           <a:lstStyle/>
+          <a:p/>
+        </p:txBody>
+      </p:sp>
+      <p:sp>
+        <p:nvSpPr>
+          <p:cNvPr id="3" name="TextBox 2"/>
+          <p:cNvSpPr txBox="1"/>
+          <p:nvPr/>
+        </p:nvSpPr>
+        <p:spPr>
+          <a:xfrm>
+            <a:off x="457200" y="274320"/>
+            <a:ext cx="8229600" cy="457200"/>
+          </a:xfrm>
+          <a:prstGeom prst="rect">
+            <a:avLst/>
+          </a:prstGeom>
+          <a:noFill/>
+        </p:spPr>
+        <p:txBody>
+          <a:bodyPr wrap="none">
+            <a:spAutoFit/>
+          </a:bodyPr>
+          <a:lstStyle/>
+          <a:p>
+            <a:pPr>
+              <a:defRPr sz="3200" b="1"/>
+            </a:pPr>
+            <a:r>
+              <a:t>More RAG Query Examples</a:t>
+            </a:r>
+          </a:p>
+        </p:txBody>
+      </p:sp>
+      <p:sp>
+        <p:nvSpPr>
+          <p:cNvPr id="4" name="TextBox 3"/>
+          <p:cNvSpPr txBox="1"/>
+          <p:nvPr/>
+        </p:nvSpPr>
+        <p:spPr>
+          <a:xfrm>
+            <a:off x="457200" y="914400"/>
+            <a:ext cx="8229600" cy="5029200"/>
+          </a:xfrm>
+          <a:prstGeom prst="rect">
+            <a:avLst/>
+          </a:prstGeom>
+          <a:solidFill>
+            <a:srgbClr val="F5F5F5"/>
+          </a:solidFill>
+        </p:spPr>
+        <p:txBody>
+          <a:bodyPr wrap="square">
+            <a:spAutoFit/>
+          </a:bodyPr>
+          <a:lstStyle/>
+          <a:p>
+            <a:pPr>
+              <a:defRPr sz="1100">
+                <a:latin typeface="Courier New"/>
+              </a:defRPr>
+            </a:pPr>
+            <a:r>
+              <a:t>Debugging Queries:</a:t>
+            </a:r>
+            <a:br/>
+            <a:r>
+              <a:t>  • "Which orders are still resting in the book?"</a:t>
+            </a:r>
+            <a:br/>
+            <a:r>
+              <a:t>  • "Why didn't order X match with order Y?"</a:t>
+            </a:r>
+            <a:br/>
+            <a:r>
+              <a:t>  • "Show me all partial fills and their cumulative quantities"</a:t>
+            </a:r>
+            <a:br/>
+            <a:r>
+              <a:t>  • "What was the spread (best bid - best ask) after order Z?"</a:t>
+            </a:r>
+            <a:br/>
+            <a:br/>
+            <a:r>
+              <a:t>Architecture Queries:</a:t>
+            </a:r>
+            <a:br/>
+            <a:r>
+              <a:t>  • "How does the system prevent race conditions?"</a:t>
+            </a:r>
+            <a:br/>
+            <a:r>
+              <a:t>  • "What happens if two orders arrive at the same price?"</a:t>
+            </a:r>
+            <a:br/>
+            <a:r>
+              <a:t>  • "Explain the relationship between Order and ExecutionReport"</a:t>
+            </a:r>
+            <a:br/>
+            <a:br/>
+            <a:r>
+              <a:t>Performance Analysis:</a:t>
+            </a:r>
+            <a:br/>
+            <a:r>
+              <a:t>  • "How many function calls does a simple match require?"</a:t>
+            </a:r>
+            <a:br/>
+            <a:r>
+              <a:t>  • "What is the complexity of adding an order to the book?"</a:t>
+            </a:r>
+            <a:br/>
+            <a:r>
+              <a:t>  • "Show me the call depth for order VQ6EAOKbQdSnFkRmVUQAAw"</a:t>
+            </a:r>
+            <a:br/>
+            <a:br/>
+            <a:r>
+              <a:t>Compliance &amp; Audit:</a:t>
+            </a:r>
+            <a:br/>
+            <a:r>
+              <a:t>  • "Show complete audit trail for order VQ6EAOKbQdSnFkRmVUQABA"</a:t>
+            </a:r>
+            <a:br/>
+            <a:r>
+              <a:t>  • "Were there any price improvements in the execution log?"</a:t>
+            </a:r>
+            <a:br/>
+            <a:r>
+              <a:t>  • "Verify all executions follow price-time priority"</a:t>
+            </a:r>
+          </a:p>
+        </p:txBody>
+      </p:sp>
+    </p:spTree>
+  </p:cSld>
+  <p:clrMapOvr>
+    <a:masterClrMapping/>
+  </p:clrMapOvr>
+</p:sld>
+</file>
+
+<file path=ppt/slides/slide22.xml><?xml version="1.0" encoding="utf-8"?>
+<p:sld xmlns:a="http://schemas.openxmlformats.org/drawingml/2006/main" xmlns:p="http://schemas.openxmlformats.org/presentationml/2006/main" xmlns:r="http://schemas.openxmlformats.org/officeDocument/2006/relationships">
+  <p:cSld>
+    <p:spTree>
+      <p:nvGrpSpPr>
+        <p:cNvPr id="1" name=""/>
+        <p:cNvGrpSpPr/>
+        <p:nvPr/>
+      </p:nvGrpSpPr>
+      <p:grpSpPr/>
+      <p:sp>
+        <p:nvSpPr>
+          <p:cNvPr id="2" name="Title 1"/>
+          <p:cNvSpPr>
+            <a:spLocks noGrp="1"/>
+          </p:cNvSpPr>
+          <p:nvPr>
+            <p:ph type="title"/>
+          </p:nvPr>
+        </p:nvSpPr>
+        <p:spPr/>
+        <p:txBody>
+          <a:bodyPr/>
+          <a:lstStyle/>
+          <a:p/>
+        </p:txBody>
+      </p:sp>
+      <p:sp>
+        <p:nvSpPr>
+          <p:cNvPr id="3" name="TextBox 2"/>
+          <p:cNvSpPr txBox="1"/>
+          <p:nvPr/>
+        </p:nvSpPr>
+        <p:spPr>
+          <a:xfrm>
+            <a:off x="457200" y="274320"/>
+            <a:ext cx="8229600" cy="457200"/>
+          </a:xfrm>
+          <a:prstGeom prst="rect">
+            <a:avLst/>
+          </a:prstGeom>
+          <a:noFill/>
+        </p:spPr>
+        <p:txBody>
+          <a:bodyPr wrap="none">
+            <a:spAutoFit/>
+          </a:bodyPr>
+          <a:lstStyle/>
+          <a:p>
+            <a:pPr>
+              <a:defRPr sz="3200" b="1"/>
+            </a:pPr>
+            <a:r>
+              <a:t>RAG Query Flow: Under the Hood</a:t>
+            </a:r>
+          </a:p>
+        </p:txBody>
+      </p:sp>
+      <p:sp>
+        <p:nvSpPr>
+          <p:cNvPr id="4" name="TextBox 3"/>
+          <p:cNvSpPr txBox="1"/>
+          <p:nvPr/>
+        </p:nvSpPr>
+        <p:spPr>
+          <a:xfrm>
+            <a:off x="457200" y="914400"/>
+            <a:ext cx="8229600" cy="5029200"/>
+          </a:xfrm>
+          <a:prstGeom prst="rect">
+            <a:avLst/>
+          </a:prstGeom>
+          <a:solidFill>
+            <a:srgbClr val="F5F5F5"/>
+          </a:solidFill>
+        </p:spPr>
+        <p:txBody>
+          <a:bodyPr wrap="square">
+            <a:spAutoFit/>
+          </a:bodyPr>
+          <a:lstStyle/>
+          <a:p>
+            <a:pPr>
+              <a:defRPr sz="1100">
+                <a:latin typeface="Courier New"/>
+              </a:defRPr>
+            </a:pPr>
+            <a:r>
+              <a:t>Query: "Explain order VQ6EAOKbQdSnFkRmVUQAAw processing"</a:t>
+            </a:r>
+            <a:br/>
+            <a:br/>
+            <a:r>
+              <a:t>Step 1: Query Instrumentation Index</a:t>
+            </a:r>
+            <a:br/>
+            <a:r>
+              <a:t>  • Vector search finds relevant log sections</a:t>
+            </a:r>
+            <a:br/>
+            <a:r>
+              <a:t>  • Retrieved: ORDER_IN, CALL events, EXEC_REPORT, SNAPSHOT</a:t>
+            </a:r>
+            <a:br/>
+            <a:r>
+              <a:t>  • Context: "SELL LIMIT, 8 units at 100.55, matched at 100.60"</a:t>
+            </a:r>
+            <a:br/>
+            <a:br/>
+            <a:r>
+              <a:t>Step 2: Query Code Index</a:t>
+            </a:r>
+            <a:br/>
+            <a:r>
+              <a:t>  • Semantic search on Java source files</a:t>
+            </a:r>
+            <a:br/>
+            <a:r>
+              <a:t>  • Retrieved: MatchingEngine.addOrder(), matchSellOrder(), executeMatch()</a:t>
+            </a:r>
+            <a:br/>
+            <a:r>
+              <a:t>  • Context: Function implementations and business logic descriptions</a:t>
+            </a:r>
+            <a:br/>
+            <a:br/>
+            <a:r>
+              <a:t>Step 3: Synthesize with Claude Opus 4</a:t>
+            </a:r>
+            <a:br/>
+            <a:r>
+              <a:t>  • Combines both contexts into coherent narrative</a:t>
+            </a:r>
+            <a:br/>
+            <a:r>
+              <a:t>  • Cross-references function UUIDs with actual calls</a:t>
+            </a:r>
+            <a:br/>
+            <a:r>
+              <a:t>  • Explains why execution price (100.60) differed from limit (100.55)</a:t>
+            </a:r>
+            <a:br/>
+            <a:br/>
+            <a:r>
+              <a:t>Result: Comprehensive answer explaining WHAT happened (logs),</a:t>
+            </a:r>
+            <a:br/>
+            <a:r>
+              <a:t>HOW it works (code), and WHY (price improvement, maker advantage).</a:t>
+            </a:r>
+            <a:br/>
+            <a:br/>
+            <a:r>
+              <a:t>The RAG pipeline acts as an AI assistant that understands both</a:t>
+            </a:r>
+            <a:br/>
+            <a:r>
+              <a:t>your code and its runtime behavior.</a:t>
+            </a:r>
+          </a:p>
+        </p:txBody>
+      </p:sp>
+    </p:spTree>
+  </p:cSld>
+  <p:clrMapOvr>
+    <a:masterClrMapping/>
+  </p:clrMapOvr>
+</p:sld>
+</file>
+
+<file path=ppt/slides/slide23.xml><?xml version="1.0" encoding="utf-8"?>
+<p:sld xmlns:a="http://schemas.openxmlformats.org/drawingml/2006/main" xmlns:p="http://schemas.openxmlformats.org/presentationml/2006/main" xmlns:r="http://schemas.openxmlformats.org/officeDocument/2006/relationships">
+  <p:cSld>
+    <p:spTree>
+      <p:nvGrpSpPr>
+        <p:cNvPr id="1" name=""/>
+        <p:cNvGrpSpPr/>
+        <p:nvPr/>
+      </p:nvGrpSpPr>
+      <p:grpSpPr/>
+      <p:sp>
+        <p:nvSpPr>
+          <p:cNvPr id="2" name="Title 1"/>
+          <p:cNvSpPr>
+            <a:spLocks noGrp="1"/>
+          </p:cNvSpPr>
+          <p:nvPr>
+            <p:ph type="title"/>
+          </p:nvPr>
+        </p:nvSpPr>
+        <p:spPr/>
+        <p:txBody>
+          <a:bodyPr/>
+          <a:lstStyle/>
+          <a:p>
+            <a:r>
+              <a:t>Use Cases &amp; Benefits</a:t>
+            </a:r>
+          </a:p>
+        </p:txBody>
+      </p:sp>
+      <p:sp>
+        <p:nvSpPr>
+          <p:cNvPr id="3" name="Content Placeholder 2"/>
+          <p:cNvSpPr>
+            <a:spLocks noGrp="1"/>
+          </p:cNvSpPr>
+          <p:nvPr>
+            <p:ph idx="1"/>
+          </p:nvPr>
+        </p:nvSpPr>
+        <p:spPr/>
+        <p:txBody>
+          <a:bodyPr/>
+          <a:lstStyle/>
+          <a:p/>
+          <a:p>
+            <a:pPr>
+              <a:defRPr sz="1800"/>
+            </a:pPr>
+            <a:r>
+              <a:t>Debugging: Trace order execution paths with AI assistance</a:t>
+            </a:r>
+          </a:p>
+          <a:p>
+            <a:pPr>
+              <a:defRPr sz="1800"/>
+            </a:pPr>
+            <a:r>
+              <a:t>  • 'Why didn't my order match?' - Get immediate answers</a:t>
+            </a:r>
+          </a:p>
+          <a:p>
+            <a:pPr>
+              <a:defRPr sz="1800"/>
+            </a:pPr>
+            <a:r>
+              <a:t>Auditing: Query historical execution patterns and anomalies</a:t>
+            </a:r>
+          </a:p>
+          <a:p>
+            <a:pPr>
+              <a:defRPr sz="1800"/>
+            </a:pPr>
+            <a:r>
+              <a:t>  • 'Show all price improvements today' - Compliance reporting</a:t>
+            </a:r>
+          </a:p>
+          <a:p>
+            <a:pPr>
+              <a:defRPr sz="1800"/>
+            </a:pPr>
+            <a:r>
+              <a:t>Education: Learn how matching engines work through examples</a:t>
+            </a:r>
+          </a:p>
+          <a:p>
+            <a:pPr>
+              <a:defRPr sz="1800"/>
+            </a:pPr>
+            <a:r>
+              <a:t>  • Students can ask questions about real executions</a:t>
+            </a:r>
+          </a:p>
+          <a:p>
+            <a:pPr>
+              <a:defRPr sz="1800"/>
+            </a:pPr>
+            <a:r>
+              <a:t>Documentation: Natural language search through code and logs</a:t>
+            </a:r>
+          </a:p>
+          <a:p>
+            <a:pPr>
+              <a:defRPr sz="1800"/>
+            </a:pPr>
+            <a:r>
+              <a:t>  • No need to grep through thousands of log lines</a:t>
+            </a:r>
+          </a:p>
+          <a:p>
+            <a:pPr>
+              <a:defRPr sz="1800"/>
+            </a:pPr>
+            <a:r>
+              <a:t>Performance Analysis: Identify bottlenecks from execution traces</a:t>
+            </a:r>
+          </a:p>
+          <a:p>
+            <a:pPr>
+              <a:defRPr sz="1800"/>
+            </a:pPr>
+            <a:r>
+              <a:t>  • 'What's the average call depth?' - Optimization insights</a:t>
+            </a:r>
+          </a:p>
+          <a:p>
+            <a:pPr>
+              <a:defRPr sz="1800"/>
+            </a:pPr>
+            <a:r>
+              <a:t>Testing: Verify behavior matches implementation expectations</a:t>
+            </a:r>
+          </a:p>
+          <a:p>
+            <a:pPr>
+              <a:defRPr sz="1800"/>
+            </a:pPr>
+            <a:r>
+              <a:t>  • 'Did order X follow price-time priority?' - Validation</a:t>
+            </a:r>
+          </a:p>
+        </p:txBody>
+      </p:sp>
+    </p:spTree>
+  </p:cSld>
+  <p:clrMapOvr>
+    <a:masterClrMapping/>
+  </p:clrMapOvr>
+</p:sld>
+</file>
+
+<file path=ppt/slides/slide24.xml><?xml version="1.0" encoding="utf-8"?>
+<p:sld xmlns:a="http://schemas.openxmlformats.org/drawingml/2006/main" xmlns:p="http://schemas.openxmlformats.org/presentationml/2006/main" xmlns:r="http://schemas.openxmlformats.org/officeDocument/2006/relationships">
+  <p:cSld>
+    <p:spTree>
+      <p:nvGrpSpPr>
+        <p:cNvPr id="1" name=""/>
+        <p:cNvGrpSpPr/>
+        <p:nvPr/>
+      </p:nvGrpSpPr>
+      <p:grpSpPr/>
+      <p:sp>
+        <p:nvSpPr>
+          <p:cNvPr id="2" name="Title 1"/>
+          <p:cNvSpPr>
+            <a:spLocks noGrp="1"/>
+          </p:cNvSpPr>
+          <p:nvPr>
+            <p:ph type="title"/>
+          </p:nvPr>
+        </p:nvSpPr>
+        <p:spPr/>
+        <p:txBody>
+          <a:bodyPr/>
+          <a:lstStyle/>
+          <a:p>
+            <a:r>
+              <a:t>Technology Stack</a:t>
+            </a:r>
+          </a:p>
+        </p:txBody>
+      </p:sp>
+      <p:sp>
+        <p:nvSpPr>
+          <p:cNvPr id="3" name="Content Placeholder 2"/>
+          <p:cNvSpPr>
+            <a:spLocks noGrp="1"/>
+          </p:cNvSpPr>
+          <p:nvPr>
+            <p:ph idx="1"/>
+          </p:nvPr>
+        </p:nvSpPr>
+        <p:spPr/>
+        <p:txBody>
+          <a:bodyPr/>
+          <a:lstStyle/>
+          <a:p/>
+          <a:p>
+            <a:pPr>
+              <a:defRPr sz="1800"/>
+            </a:pPr>
+            <a:r>
+              <a:t>Core Engine: Java 17, Maven 3.6+</a:t>
+            </a:r>
+          </a:p>
+          <a:p>
+            <a:pPr>
+              <a:defRPr sz="1800"/>
+            </a:pPr>
+            <a:r>
+              <a:t>Data Structures: TreeMap (order book), LinkedList (FIFO)</a:t>
+            </a:r>
+          </a:p>
+          <a:p>
+            <a:pPr>
+              <a:defRPr sz="1800"/>
+            </a:pPr>
+            <a:r>
+              <a:t>Instrumentation: Byte Buddy 1.14.11, Java Agent API</a:t>
+            </a:r>
+          </a:p>
+          <a:p>
+            <a:pPr>
+              <a:defRPr sz="1800"/>
+            </a:pPr>
+            <a:r>
+              <a:t>RAG Framework: LlamaIndex 0.14+</a:t>
+            </a:r>
+          </a:p>
+          <a:p>
+            <a:pPr>
+              <a:defRPr sz="1800"/>
+            </a:pPr>
+            <a:r>
+              <a:t>LLM: Anthropic Claude Opus 4 (claude-opus-4-20250514)</a:t>
+            </a:r>
+          </a:p>
+          <a:p>
+            <a:pPr>
+              <a:defRPr sz="1800"/>
+            </a:pPr>
+            <a:r>
+              <a:t>Embeddings: OpenAI text-embedding-3-small</a:t>
+            </a:r>
+          </a:p>
+          <a:p>
+            <a:pPr>
+              <a:defRPr sz="1800"/>
+            </a:pPr>
+            <a:r>
+              <a:t>Python: 3.12+ for RAG pipeline</a:t>
+            </a:r>
+          </a:p>
+          <a:p>
+            <a:pPr>
+              <a:defRPr sz="1800"/>
+            </a:pPr>
+            <a:r>
+              <a:t>CSV I/O: Standard Java libraries (no external dependencies)</a:t>
+            </a:r>
+          </a:p>
+        </p:txBody>
+      </p:sp>
+    </p:spTree>
+  </p:cSld>
+  <p:clrMapOvr>
+    <a:masterClrMapping/>
+  </p:clrMapOvr>
+</p:sld>
+</file>
+
+<file path=ppt/slides/slide25.xml><?xml version="1.0" encoding="utf-8"?>
+<p:sld xmlns:a="http://schemas.openxmlformats.org/drawingml/2006/main" xmlns:p="http://schemas.openxmlformats.org/presentationml/2006/main" xmlns:r="http://schemas.openxmlformats.org/officeDocument/2006/relationships">
+  <p:cSld>
+    <p:spTree>
+      <p:nvGrpSpPr>
+        <p:cNvPr id="1" name=""/>
+        <p:cNvGrpSpPr/>
+        <p:nvPr/>
+      </p:nvGrpSpPr>
+      <p:grpSpPr/>
+      <p:sp>
+        <p:nvSpPr>
+          <p:cNvPr id="2" name="Title 1"/>
+          <p:cNvSpPr>
+            <a:spLocks noGrp="1"/>
+          </p:cNvSpPr>
+          <p:nvPr>
+            <p:ph type="title"/>
+          </p:nvPr>
+        </p:nvSpPr>
+        <p:spPr/>
+        <p:txBody>
+          <a:bodyPr/>
+          <a:lstStyle/>
+          <a:p>
+            <a:r>
+              <a:t>Key Innovations</a:t>
+            </a:r>
+          </a:p>
+        </p:txBody>
+      </p:sp>
+      <p:sp>
+        <p:nvSpPr>
+          <p:cNvPr id="3" name="Content Placeholder 2"/>
+          <p:cNvSpPr>
+            <a:spLocks noGrp="1"/>
+          </p:cNvSpPr>
+          <p:nvPr>
+            <p:ph idx="1"/>
+          </p:nvPr>
+        </p:nvSpPr>
+        <p:spPr/>
+        <p:txBody>
+          <a:bodyPr/>
+          <a:lstStyle/>
+          <a:p/>
+          <a:p>
+            <a:pPr>
+              <a:defRPr sz="1800"/>
+            </a:pPr>
+            <a:r>
+              <a:t>UUID-Based Function Identification:</a:t>
+            </a:r>
+          </a:p>
+          <a:p>
+            <a:pPr>
+              <a:defRPr sz="1800"/>
+            </a:pPr>
+            <a:r>
+              <a:t>  • Stable across code refactoring, Base64 encoded (22 chars)</a:t>
+            </a:r>
+          </a:p>
+          <a:p>
+            <a:pPr>
+              <a:defRPr sz="1800"/>
+            </a:pPr>
+            <a:r>
+              <a:t>Metadata-Driven Instrumentation:</a:t>
+            </a:r>
+          </a:p>
+          <a:p>
+            <a:pPr>
+              <a:defRPr sz="1800"/>
+            </a:pPr>
+            <a:r>
+              <a:t>  • @FunctionMetadata self-documents business logic</a:t>
+            </a:r>
+          </a:p>
+          <a:p>
+            <a:pPr>
+              <a:defRPr sz="1800"/>
+            </a:pPr>
+            <a:r>
+              <a:t>Zero-Overhead Option:</a:t>
+            </a:r>
+          </a:p>
+          <a:p>
+            <a:pPr>
+              <a:defRPr sz="1800"/>
+            </a:pPr>
+            <a:r>
+              <a:t>  • Java agent can be disabled in production (no performance impact)</a:t>
+            </a:r>
+          </a:p>
+          <a:p>
+            <a:pPr>
+              <a:defRPr sz="1800"/>
+            </a:pPr>
+            <a:r>
+              <a:t>Dual-Index RAG:</a:t>
+            </a:r>
+          </a:p>
+          <a:p>
+            <a:pPr>
+              <a:defRPr sz="1800"/>
+            </a:pPr>
+            <a:r>
+              <a:t>  • Separate indices for 'what happened' vs 'how it works'</a:t>
+            </a:r>
+          </a:p>
+          <a:p>
+            <a:pPr>
+              <a:defRPr sz="1800"/>
+            </a:pPr>
+            <a:r>
+              <a:t>Context Propagation:</a:t>
+            </a:r>
+          </a:p>
+          <a:p>
+            <a:pPr>
+              <a:defRPr sz="1800"/>
+            </a:pPr>
+            <a:r>
+              <a:t>  • Thread-local tracking maintains order ID across call stack</a:t>
+            </a:r>
+          </a:p>
+          <a:p>
+            <a:pPr>
+              <a:defRPr sz="1800"/>
+            </a:pPr>
+            <a:r>
+              <a:t>AI-Powered Analysis:</a:t>
+            </a:r>
+          </a:p>
+          <a:p>
+            <a:pPr>
+              <a:defRPr sz="1800"/>
+            </a:pPr>
+            <a:r>
+              <a:t>  • Natural language queries on technical execution traces</a:t>
+            </a:r>
+          </a:p>
+          <a:p>
+            <a:pPr>
+              <a:defRPr sz="1800"/>
+            </a:pPr>
+            <a:r>
+              <a:t>Complete Audit Trail:</a:t>
+            </a:r>
+          </a:p>
+          <a:p>
+            <a:pPr>
+              <a:defRPr sz="1800"/>
+            </a:pPr>
+            <a:r>
+              <a:t>  • Every event captured: ORDER_IN → CALL → EXEC_REPORT → SNAPSHOT</a:t>
+            </a:r>
+          </a:p>
+        </p:txBody>
+      </p:sp>
+    </p:spTree>
+  </p:cSld>
+  <p:clrMapOvr>
+    <a:masterClrMapping/>
+  </p:clrMapOvr>
+</p:sld>
+</file>
+
+<file path=ppt/slides/slide26.xml><?xml version="1.0" encoding="utf-8"?>
+<p:sld xmlns:a="http://schemas.openxmlformats.org/drawingml/2006/main" xmlns:p="http://schemas.openxmlformats.org/presentationml/2006/main" xmlns:r="http://schemas.openxmlformats.org/officeDocument/2006/relationships">
+  <p:cSld>
+    <p:spTree>
+      <p:nvGrpSpPr>
+        <p:cNvPr id="1" name=""/>
+        <p:cNvGrpSpPr/>
+        <p:nvPr/>
+      </p:nvGrpSpPr>
+      <p:grpSpPr/>
+      <p:sp>
+        <p:nvSpPr>
+          <p:cNvPr id="2" name="Title 1"/>
+          <p:cNvSpPr>
+            <a:spLocks noGrp="1"/>
+          </p:cNvSpPr>
+          <p:nvPr>
+            <p:ph type="title"/>
+          </p:nvPr>
+        </p:nvSpPr>
+        <p:spPr/>
+        <p:txBody>
+          <a:bodyPr/>
+          <a:lstStyle/>
+          <a:p>
+            <a:r>
+              <a:t>Demo: End-to-End Workflow</a:t>
+            </a:r>
+          </a:p>
+        </p:txBody>
+      </p:sp>
+      <p:sp>
+        <p:nvSpPr>
+          <p:cNvPr id="3" name="Content Placeholder 2"/>
+          <p:cNvSpPr>
+            <a:spLocks noGrp="1"/>
+          </p:cNvSpPr>
+          <p:nvPr>
+            <p:ph idx="1"/>
+          </p:nvPr>
+        </p:nvSpPr>
+        <p:spPr/>
+        <p:txBody>
+          <a:bodyPr/>
+          <a:lstStyle/>
+          <a:p/>
+          <a:p>
+            <a:pPr>
+              <a:defRPr sz="1800"/>
+            </a:pPr>
+            <a:r>
+              <a:t>1. Prepare: Create orders.csv with sample orders</a:t>
+            </a:r>
+          </a:p>
+          <a:p>
+            <a:pPr>
+              <a:defRPr sz="1800"/>
+            </a:pPr>
+            <a:r>
+              <a:t>2. Build: mvn clean package (engine + agent)</a:t>
+            </a:r>
+          </a:p>
+          <a:p>
+            <a:pPr>
+              <a:defRPr sz="1800"/>
+            </a:pPr>
+            <a:r>
+              <a:t>3. Run with Instrumentation:</a:t>
+            </a:r>
+          </a:p>
+          <a:p>
+            <a:pPr>
+              <a:defRPr sz="1800"/>
+            </a:pPr>
+            <a:r>
+              <a:t>   java -javaagent:agent/target/matching-agent-1.0-SNAPSHOT.jar \</a:t>
+            </a:r>
+          </a:p>
+          <a:p>
+            <a:pPr>
+              <a:defRPr sz="1800"/>
+            </a:pPr>
+            <a:r>
+              <a:t>        -jar target/matching-engine-1.0-SNAPSHOT.jar</a:t>
+            </a:r>
+          </a:p>
+          <a:p>
+            <a:pPr>
+              <a:defRPr sz="1800"/>
+            </a:pPr>
+            <a:r>
+              <a:t>4. Output: executions.csv + instrumentation.log generated</a:t>
+            </a:r>
+          </a:p>
+          <a:p>
+            <a:pPr>
+              <a:defRPr sz="1800"/>
+            </a:pPr>
+            <a:r>
+              <a:t>5. Start RAG: python3 rag_query.py</a:t>
+            </a:r>
+          </a:p>
+          <a:p>
+            <a:pPr>
+              <a:defRPr sz="1800"/>
+            </a:pPr>
+            <a:r>
+              <a:t>6. Query: Ask natural language questions</a:t>
+            </a:r>
+          </a:p>
+          <a:p>
+            <a:pPr>
+              <a:defRPr sz="1800"/>
+            </a:pPr>
+            <a:r>
+              <a:t>7. Analyze: Get AI-powered insights combining code + execution</a:t>
+            </a:r>
+          </a:p>
+        </p:txBody>
+      </p:sp>
+    </p:spTree>
+  </p:cSld>
+  <p:clrMapOvr>
+    <a:masterClrMapping/>
+  </p:clrMapOvr>
+</p:sld>
+</file>
+
+<file path=ppt/slides/slide27.xml><?xml version="1.0" encoding="utf-8"?>
+<p:sld xmlns:a="http://schemas.openxmlformats.org/drawingml/2006/main" xmlns:p="http://schemas.openxmlformats.org/presentationml/2006/main" xmlns:r="http://schemas.openxmlformats.org/officeDocument/2006/relationships">
+  <p:cSld>
+    <p:spTree>
+      <p:nvGrpSpPr>
+        <p:cNvPr id="1" name=""/>
+        <p:cNvGrpSpPr/>
+        <p:nvPr/>
+      </p:nvGrpSpPr>
+      <p:grpSpPr/>
+      <p:sp>
+        <p:nvSpPr>
+          <p:cNvPr id="2" name="Title 1"/>
+          <p:cNvSpPr>
+            <a:spLocks noGrp="1"/>
+          </p:cNvSpPr>
+          <p:nvPr>
+            <p:ph type="title"/>
+          </p:nvPr>
+        </p:nvSpPr>
+        <p:spPr/>
+        <p:txBody>
+          <a:bodyPr/>
+          <a:lstStyle/>
+          <a:p>
+            <a:r>
+              <a:t>Performance &amp; Scalability</a:t>
+            </a:r>
+          </a:p>
+        </p:txBody>
+      </p:sp>
+      <p:sp>
+        <p:nvSpPr>
+          <p:cNvPr id="3" name="Content Placeholder 2"/>
+          <p:cNvSpPr>
+            <a:spLocks noGrp="1"/>
+          </p:cNvSpPr>
+          <p:nvPr>
+            <p:ph idx="1"/>
+          </p:nvPr>
+        </p:nvSpPr>
+        <p:spPr/>
+        <p:txBody>
+          <a:bodyPr/>
+          <a:lstStyle/>
+          <a:p/>
+          <a:p>
+            <a:pPr>
+              <a:defRPr sz="1800"/>
+            </a:pPr>
+            <a:r>
+              <a:t>Matching Engine:</a:t>
+            </a:r>
+          </a:p>
+          <a:p>
+            <a:pPr>
+              <a:defRPr sz="1800"/>
+            </a:pPr>
+            <a:r>
+              <a:t>  • O(log n) insertion, O(log n) best price lookup (TreeMap)</a:t>
+            </a:r>
+          </a:p>
+          <a:p>
+            <a:pPr>
+              <a:defRPr sz="1800"/>
+            </a:pPr>
+            <a:r>
+              <a:t>  • O(1) FIFO queue operations (LinkedList)</a:t>
+            </a:r>
+          </a:p>
+          <a:p>
+            <a:pPr>
+              <a:defRPr sz="1800"/>
+            </a:pPr>
+            <a:r>
+              <a:t>Instrumentation:</a:t>
+            </a:r>
+          </a:p>
+          <a:p>
+            <a:pPr>
+              <a:defRPr sz="1800"/>
+            </a:pPr>
+            <a:r>
+              <a:t>  • &lt;5% overhead when enabled</a:t>
+            </a:r>
+          </a:p>
+          <a:p>
+            <a:pPr>
+              <a:defRPr sz="1800"/>
+            </a:pPr>
+            <a:r>
+              <a:t>  • 0% overhead when disabled (just don't use -javaagent)</a:t>
+            </a:r>
+          </a:p>
+          <a:p>
+            <a:pPr>
+              <a:defRPr sz="1800"/>
+            </a:pPr>
+            <a:r>
+              <a:t>RAG Pipeline:</a:t>
+            </a:r>
+          </a:p>
+          <a:p>
+            <a:pPr>
+              <a:defRPr sz="1800"/>
+            </a:pPr>
+            <a:r>
+              <a:t>  • Indexing: One-time cost, ~2-5 seconds for sample data</a:t>
+            </a:r>
+          </a:p>
+          <a:p>
+            <a:pPr>
+              <a:defRPr sz="1800"/>
+            </a:pPr>
+            <a:r>
+              <a:t>  • Queries: 2-5 seconds per query (depends on complexity)</a:t>
+            </a:r>
+          </a:p>
+          <a:p>
+            <a:pPr>
+              <a:defRPr sz="1800"/>
+            </a:pPr>
+            <a:r>
+              <a:t>  • Embeddings: Cached locally after first generation</a:t>
+            </a:r>
+          </a:p>
+          <a:p>
+            <a:pPr>
+              <a:defRPr sz="1800"/>
+            </a:pPr>
+            <a:r>
+              <a:t>  • Cost: ~$0.01-0.05 per query (Claude Opus 4 pricing)</a:t>
+            </a:r>
+          </a:p>
+          <a:p>
+            <a:pPr>
+              <a:defRPr sz="1800"/>
+            </a:pPr>
+            <a:r>
+              <a:t>Scalability: Can handle thousands of log lines and dozens of files</a:t>
+            </a:r>
+          </a:p>
+        </p:txBody>
+      </p:sp>
+    </p:spTree>
+  </p:cSld>
+  <p:clrMapOvr>
+    <a:masterClrMapping/>
+  </p:clrMapOvr>
+</p:sld>
+</file>
+
+<file path=ppt/slides/slide28.xml><?xml version="1.0" encoding="utf-8"?>
+<p:sld xmlns:a="http://schemas.openxmlformats.org/drawingml/2006/main" xmlns:p="http://schemas.openxmlformats.org/presentationml/2006/main" xmlns:r="http://schemas.openxmlformats.org/officeDocument/2006/relationships">
+  <p:cSld>
+    <p:spTree>
+      <p:nvGrpSpPr>
+        <p:cNvPr id="1" name=""/>
+        <p:cNvGrpSpPr/>
+        <p:nvPr/>
+      </p:nvGrpSpPr>
+      <p:grpSpPr/>
+      <p:sp>
+        <p:nvSpPr>
+          <p:cNvPr id="2" name="Title 1"/>
+          <p:cNvSpPr>
+            <a:spLocks noGrp="1"/>
+          </p:cNvSpPr>
+          <p:nvPr>
+            <p:ph type="title"/>
+          </p:nvPr>
+        </p:nvSpPr>
+        <p:spPr/>
+        <p:txBody>
+          <a:bodyPr/>
+          <a:lstStyle/>
+          <a:p>
+            <a:r>
+              <a:t>Future Enhancements</a:t>
+            </a:r>
+          </a:p>
+        </p:txBody>
+      </p:sp>
+      <p:sp>
+        <p:nvSpPr>
+          <p:cNvPr id="3" name="Content Placeholder 2"/>
+          <p:cNvSpPr>
+            <a:spLocks noGrp="1"/>
+          </p:cNvSpPr>
+          <p:nvPr>
+            <p:ph idx="1"/>
+          </p:nvPr>
+        </p:nvSpPr>
+        <p:spPr/>
+        <p:txBody>
+          <a:bodyPr/>
+          <a:lstStyle/>
+          <a:p/>
+          <a:p>
+            <a:pPr>
+              <a:defRPr sz="1800"/>
+            </a:pPr>
+            <a:r>
+              <a:t>Real-Time Features:</a:t>
+            </a:r>
+          </a:p>
+          <a:p>
+            <a:pPr>
+              <a:defRPr sz="1800"/>
+            </a:pPr>
+            <a:r>
+              <a:t>  • Streaming instrumentation events (Kafka/RabbitMQ)</a:t>
+            </a:r>
+          </a:p>
+          <a:p>
+            <a:pPr>
+              <a:defRPr sz="1800"/>
+            </a:pPr>
+            <a:r>
+              <a:t>  • Live RAG queries during execution (WebSocket)</a:t>
+            </a:r>
+          </a:p>
+          <a:p>
+            <a:pPr>
+              <a:defRPr sz="1800"/>
+            </a:pPr>
+            <a:r>
+              <a:t>Enhanced Visualization:</a:t>
+            </a:r>
+          </a:p>
+          <a:p>
+            <a:pPr>
+              <a:defRPr sz="1800"/>
+            </a:pPr>
+            <a:r>
+              <a:t>  • Order book depth charts in RAG responses</a:t>
+            </a:r>
+          </a:p>
+          <a:p>
+            <a:pPr>
+              <a:defRPr sz="1800"/>
+            </a:pPr>
+            <a:r>
+              <a:t>  • Execution timeline visualizations</a:t>
+            </a:r>
+          </a:p>
+          <a:p>
+            <a:pPr>
+              <a:defRPr sz="1800"/>
+            </a:pPr>
+            <a:r>
+              <a:t>Multi-Symbol Trading:</a:t>
+            </a:r>
+          </a:p>
+          <a:p>
+            <a:pPr>
+              <a:defRPr sz="1800"/>
+            </a:pPr>
+            <a:r>
+              <a:t>  • Symbol-specific indices for cross-symbol analysis</a:t>
+            </a:r>
+          </a:p>
+          <a:p>
+            <a:pPr>
+              <a:defRPr sz="1800"/>
+            </a:pPr>
+            <a:r>
+              <a:t>  • Market-wide queries across all symbols</a:t>
+            </a:r>
+          </a:p>
+          <a:p>
+            <a:pPr>
+              <a:defRPr sz="1800"/>
+            </a:pPr>
+            <a:r>
+              <a:t>Advanced Analytics:</a:t>
+            </a:r>
+          </a:p>
+          <a:p>
+            <a:pPr>
+              <a:defRPr sz="1800"/>
+            </a:pPr>
+            <a:r>
+              <a:t>  • Performance profiling (CPU, memory, latency)</a:t>
+            </a:r>
+          </a:p>
+          <a:p>
+            <a:pPr>
+              <a:defRPr sz="1800"/>
+            </a:pPr>
+            <a:r>
+              <a:t>  • Automated test case generation from traces</a:t>
+            </a:r>
+          </a:p>
+          <a:p>
+            <a:pPr>
+              <a:defRPr sz="1800"/>
+            </a:pPr>
+            <a:r>
+              <a:t>  • Anomaly detection using AI on execution patterns</a:t>
+            </a:r>
+          </a:p>
+        </p:txBody>
+      </p:sp>
+    </p:spTree>
+  </p:cSld>
+  <p:clrMapOvr>
+    <a:masterClrMapping/>
+  </p:clrMapOvr>
+</p:sld>
+</file>
+
+<file path=ppt/slides/slide29.xml><?xml version="1.0" encoding="utf-8"?>
+<p:sld xmlns:a="http://schemas.openxmlformats.org/drawingml/2006/main" xmlns:p="http://schemas.openxmlformats.org/presentationml/2006/main" xmlns:r="http://schemas.openxmlformats.org/officeDocument/2006/relationships">
+  <p:cSld>
+    <p:spTree>
+      <p:nvGrpSpPr>
+        <p:cNvPr id="1" name=""/>
+        <p:cNvGrpSpPr/>
+        <p:nvPr/>
+      </p:nvGrpSpPr>
+      <p:grpSpPr/>
+      <p:sp>
+        <p:nvSpPr>
+          <p:cNvPr id="2" name="Title 1"/>
+          <p:cNvSpPr>
+            <a:spLocks noGrp="1"/>
+          </p:cNvSpPr>
+          <p:nvPr>
+            <p:ph type="title"/>
+          </p:nvPr>
+        </p:nvSpPr>
+        <p:spPr/>
+        <p:txBody>
+          <a:bodyPr/>
+          <a:lstStyle/>
           <a:p>
             <a:r>
               <a:t>Conclusion</a:t>
@@ -4758,40 +6456,93 @@
               <a:defRPr sz="1800"/>
             </a:pPr>
             <a:r>
-              <a:t>Comprehensive matching engine with production-ready features</a:t>
-            </a:r>
-          </a:p>
-          <a:p>
-            <a:pPr>
-              <a:defRPr sz="1800"/>
-            </a:pPr>
-            <a:r>
-              <a:t>Innovative instrumentation approach using annotations + bytecode</a:t>
-            </a:r>
-          </a:p>
-          <a:p>
-            <a:pPr>
-              <a:defRPr sz="1800"/>
-            </a:pPr>
-            <a:r>
-              <a:t>Powerful RAG pipeline for code and execution analysis</a:t>
-            </a:r>
-          </a:p>
-          <a:p>
-            <a:pPr>
-              <a:defRPr sz="1800"/>
-            </a:pPr>
-            <a:r>
-              <a:t>AI-powered natural language queries on technical content</a:t>
-            </a:r>
-          </a:p>
-          <a:p>
-            <a:pPr>
-              <a:defRPr sz="1800"/>
-            </a:pPr>
-            <a:r>
-              <a:t>Open source and ready to extend</a:t>
-            </a:r>
+              <a:t>✓ Production-Ready Matching Engine:</a:t>
+            </a:r>
+          </a:p>
+          <a:p>
+            <a:pPr>
+              <a:defRPr sz="1800"/>
+            </a:pPr>
+            <a:r>
+              <a:t>  • Price-time priority, partial fills, market/limit orders</a:t>
+            </a:r>
+          </a:p>
+          <a:p>
+            <a:pPr>
+              <a:defRPr sz="1800"/>
+            </a:pPr>
+            <a:r>
+              <a:t>✓ Innovative Instrumentation:</a:t>
+            </a:r>
+          </a:p>
+          <a:p>
+            <a:pPr>
+              <a:defRPr sz="1800"/>
+            </a:pPr>
+            <a:r>
+              <a:t>  • @FunctionMetadata annotations + Byte Buddy bytecode manipulation</a:t>
+            </a:r>
+          </a:p>
+          <a:p>
+            <a:pPr>
+              <a:defRPr sz="1800"/>
+            </a:pPr>
+            <a:r>
+              <a:t>  • Complete audit trail with zero code changes to core engine</a:t>
+            </a:r>
+          </a:p>
+          <a:p>
+            <a:pPr>
+              <a:defRPr sz="1800"/>
+            </a:pPr>
+            <a:r>
+              <a:t>✓ AI-Powered RAG Pipeline:</a:t>
+            </a:r>
+          </a:p>
+          <a:p>
+            <a:pPr>
+              <a:defRPr sz="1800"/>
+            </a:pPr>
+            <a:r>
+              <a:t>  • Natural language queries on both code and execution traces</a:t>
+            </a:r>
+          </a:p>
+          <a:p>
+            <a:pPr>
+              <a:defRPr sz="1800"/>
+            </a:pPr>
+            <a:r>
+              <a:t>  • Claude Opus 4 synthesizes answers from dual indices</a:t>
+            </a:r>
+          </a:p>
+          <a:p>
+            <a:pPr>
+              <a:defRPr sz="1800"/>
+            </a:pPr>
+            <a:r>
+              <a:t>✓ Educational Value:</a:t>
+            </a:r>
+          </a:p>
+          <a:p>
+            <a:pPr>
+              <a:defRPr sz="1800"/>
+            </a:pPr>
+            <a:r>
+              <a:t>  • Learn matching engines through real examples</a:t>
+            </a:r>
+          </a:p>
+          <a:p>
+            <a:pPr>
+              <a:defRPr sz="1800"/>
+            </a:pPr>
+            <a:r>
+              <a:t>  • Debugging and analysis with AI assistance</a:t>
+            </a:r>
+          </a:p>
+          <a:p>
+            <a:pPr>
+              <a:defRPr sz="1800"/>
+            </a:pPr>
           </a:p>
           <a:p>
             <a:pPr>
@@ -4806,7 +6557,7 @@
               <a:defRPr sz="1800"/>
             </a:pPr>
             <a:r>
-              <a:t>Demonstrates synergy between traditional systems and modern AI</a:t>
+              <a:t>Demonstrates powerful synergy: Traditional Systems + Modern AI</a:t>
             </a:r>
           </a:p>
         </p:txBody>

</xml_diff>